<commit_message>
Added Correct Monthly Report
Replaced blank T12 with correct one.
</commit_message>
<xml_diff>
--- a/Assignments/T12-Monthly _Report.pptx
+++ b/Assignments/T12-Monthly _Report.pptx
@@ -129,6 +129,259 @@
 </p:presentation>
 </file>
 
+<file path=ppt/revisionInfo.xml><?xml version="1.0" encoding="utf-8"?>
+<p1510:revInfo xmlns:a="http://schemas.openxmlformats.org/drawingml/2006/main" xmlns:r="http://schemas.openxmlformats.org/officeDocument/2006/relationships" xmlns:p1510="http://schemas.microsoft.com/office/powerpoint/2015/10/main">
+  <p1510:revLst>
+    <p1510:client id="{34F19735-3DBA-4EDF-8A4B-558303336F37}" v="6" dt="2019-12-04T23:30:12.801"/>
+    <p1510:client id="{984129D0-589A-4C79-916A-A31BE91446F8}" v="46" dt="2019-12-04T23:59:28.873"/>
+    <p1510:client id="{CBF77EC3-C0C9-485B-AE33-DDC2422FA287}" v="410" dt="2019-12-05T00:06:55.643"/>
+  </p1510:revLst>
+</p1510:revInfo>
+</file>
+
+<file path=ppt/changesInfos/changesInfo1.xml><?xml version="1.0" encoding="utf-8"?>
+<pc:chgInfo xmlns:a="http://schemas.openxmlformats.org/drawingml/2006/main" xmlns:r="http://schemas.openxmlformats.org/officeDocument/2006/relationships" xmlns:ac="http://schemas.microsoft.com/office/drawing/2013/main/command" xmlns:pc="http://schemas.microsoft.com/office/powerpoint/2013/main/command">
+  <pc:docChgLst>
+    <pc:chgData name="Guest User" providerId="Windows Live" clId="Web-{34F19735-3DBA-4EDF-8A4B-558303336F37}"/>
+    <pc:docChg chg="modSld">
+      <pc:chgData name="Guest User" userId="" providerId="Windows Live" clId="Web-{34F19735-3DBA-4EDF-8A4B-558303336F37}" dt="2019-12-04T23:30:12.801" v="5" actId="20577"/>
+      <pc:docMkLst>
+        <pc:docMk/>
+      </pc:docMkLst>
+      <pc:sldChg chg="modSp">
+        <pc:chgData name="Guest User" userId="" providerId="Windows Live" clId="Web-{34F19735-3DBA-4EDF-8A4B-558303336F37}" dt="2019-12-04T23:30:12.801" v="5" actId="20577"/>
+        <pc:sldMkLst>
+          <pc:docMk/>
+          <pc:sldMk cId="2676045318" sldId="370"/>
+        </pc:sldMkLst>
+        <pc:spChg chg="mod">
+          <ac:chgData name="Guest User" userId="" providerId="Windows Live" clId="Web-{34F19735-3DBA-4EDF-8A4B-558303336F37}" dt="2019-12-04T23:30:12.801" v="5" actId="20577"/>
+          <ac:spMkLst>
+            <pc:docMk/>
+            <pc:sldMk cId="2676045318" sldId="370"/>
+            <ac:spMk id="3" creationId="{00000000-0000-0000-0000-000000000000}"/>
+          </ac:spMkLst>
+        </pc:spChg>
+      </pc:sldChg>
+    </pc:docChg>
+  </pc:docChgLst>
+  <pc:docChgLst>
+    <pc:chgData name="Andrew Chapin" userId="1c6d49aad9381a94" providerId="LiveId" clId="{984129D0-589A-4C79-916A-A31BE91446F8}"/>
+    <pc:docChg chg="custSel modSld">
+      <pc:chgData name="Andrew Chapin" userId="1c6d49aad9381a94" providerId="LiveId" clId="{984129D0-589A-4C79-916A-A31BE91446F8}" dt="2019-12-04T23:59:28.874" v="45" actId="478"/>
+      <pc:docMkLst>
+        <pc:docMk/>
+      </pc:docMkLst>
+      <pc:sldChg chg="delSp modSp">
+        <pc:chgData name="Andrew Chapin" userId="1c6d49aad9381a94" providerId="LiveId" clId="{984129D0-589A-4C79-916A-A31BE91446F8}" dt="2019-12-04T23:59:28.874" v="45" actId="478"/>
+        <pc:sldMkLst>
+          <pc:docMk/>
+          <pc:sldMk cId="4252225560" sldId="372"/>
+        </pc:sldMkLst>
+        <pc:spChg chg="del mod">
+          <ac:chgData name="Andrew Chapin" userId="1c6d49aad9381a94" providerId="LiveId" clId="{984129D0-589A-4C79-916A-A31BE91446F8}" dt="2019-12-04T23:59:28.874" v="45" actId="478"/>
+          <ac:spMkLst>
+            <pc:docMk/>
+            <pc:sldMk cId="4252225560" sldId="372"/>
+            <ac:spMk id="12" creationId="{06B0089A-8946-4C79-B41A-A1E707C420DF}"/>
+          </ac:spMkLst>
+        </pc:spChg>
+        <pc:picChg chg="mod">
+          <ac:chgData name="Andrew Chapin" userId="1c6d49aad9381a94" providerId="LiveId" clId="{984129D0-589A-4C79-916A-A31BE91446F8}" dt="2019-12-04T23:59:22.724" v="43" actId="1036"/>
+          <ac:picMkLst>
+            <pc:docMk/>
+            <pc:sldMk cId="4252225560" sldId="372"/>
+            <ac:picMk id="8" creationId="{C4357EB2-853C-4A76-BCB3-7E73ED7E309C}"/>
+          </ac:picMkLst>
+        </pc:picChg>
+      </pc:sldChg>
+    </pc:docChg>
+  </pc:docChgLst>
+  <pc:docChgLst>
+    <pc:chgData name="Andre Herrera" userId="8bb6a1e7bcbf12ca" providerId="LiveId" clId="{CBF77EC3-C0C9-485B-AE33-DDC2422FA287}"/>
+    <pc:docChg chg="undo custSel addSld delSld modSld">
+      <pc:chgData name="Andre Herrera" userId="8bb6a1e7bcbf12ca" providerId="LiveId" clId="{CBF77EC3-C0C9-485B-AE33-DDC2422FA287}" dt="2019-12-05T00:41:50.920" v="646" actId="20577"/>
+      <pc:docMkLst>
+        <pc:docMk/>
+      </pc:docMkLst>
+      <pc:sldChg chg="modSp">
+        <pc:chgData name="Andre Herrera" userId="8bb6a1e7bcbf12ca" providerId="LiveId" clId="{CBF77EC3-C0C9-485B-AE33-DDC2422FA287}" dt="2019-12-05T00:41:50.920" v="646" actId="20577"/>
+        <pc:sldMkLst>
+          <pc:docMk/>
+          <pc:sldMk cId="2676045318" sldId="370"/>
+        </pc:sldMkLst>
+        <pc:spChg chg="mod">
+          <ac:chgData name="Andre Herrera" userId="8bb6a1e7bcbf12ca" providerId="LiveId" clId="{CBF77EC3-C0C9-485B-AE33-DDC2422FA287}" dt="2019-12-05T00:41:50.920" v="646" actId="20577"/>
+          <ac:spMkLst>
+            <pc:docMk/>
+            <pc:sldMk cId="2676045318" sldId="370"/>
+            <ac:spMk id="3" creationId="{00000000-0000-0000-0000-000000000000}"/>
+          </ac:spMkLst>
+        </pc:spChg>
+        <pc:spChg chg="mod">
+          <ac:chgData name="Andre Herrera" userId="8bb6a1e7bcbf12ca" providerId="LiveId" clId="{CBF77EC3-C0C9-485B-AE33-DDC2422FA287}" dt="2019-12-04T23:32:43.416" v="36" actId="20577"/>
+          <ac:spMkLst>
+            <pc:docMk/>
+            <pc:sldMk cId="2676045318" sldId="370"/>
+            <ac:spMk id="4" creationId="{00000000-0000-0000-0000-000000000000}"/>
+          </ac:spMkLst>
+        </pc:spChg>
+      </pc:sldChg>
+      <pc:sldChg chg="addSp delSp modSp add del">
+        <pc:chgData name="Andre Herrera" userId="8bb6a1e7bcbf12ca" providerId="LiveId" clId="{CBF77EC3-C0C9-485B-AE33-DDC2422FA287}" dt="2019-12-04T23:57:58.325" v="250" actId="20577"/>
+        <pc:sldMkLst>
+          <pc:docMk/>
+          <pc:sldMk cId="3516692141" sldId="371"/>
+        </pc:sldMkLst>
+        <pc:spChg chg="mod">
+          <ac:chgData name="Andre Herrera" userId="8bb6a1e7bcbf12ca" providerId="LiveId" clId="{CBF77EC3-C0C9-485B-AE33-DDC2422FA287}" dt="2019-12-04T23:57:58.325" v="250" actId="20577"/>
+          <ac:spMkLst>
+            <pc:docMk/>
+            <pc:sldMk cId="3516692141" sldId="371"/>
+            <ac:spMk id="3" creationId="{00000000-0000-0000-0000-000000000000}"/>
+          </ac:spMkLst>
+        </pc:spChg>
+        <pc:spChg chg="del">
+          <ac:chgData name="Andre Herrera" userId="8bb6a1e7bcbf12ca" providerId="LiveId" clId="{CBF77EC3-C0C9-485B-AE33-DDC2422FA287}" dt="2019-12-04T23:42:04.669" v="73" actId="478"/>
+          <ac:spMkLst>
+            <pc:docMk/>
+            <pc:sldMk cId="3516692141" sldId="371"/>
+            <ac:spMk id="4" creationId="{00000000-0000-0000-0000-000000000000}"/>
+          </ac:spMkLst>
+        </pc:spChg>
+        <pc:spChg chg="add mod">
+          <ac:chgData name="Andre Herrera" userId="8bb6a1e7bcbf12ca" providerId="LiveId" clId="{CBF77EC3-C0C9-485B-AE33-DDC2422FA287}" dt="2019-12-04T23:39:19.003" v="62" actId="1076"/>
+          <ac:spMkLst>
+            <pc:docMk/>
+            <pc:sldMk cId="3516692141" sldId="371"/>
+            <ac:spMk id="5" creationId="{520FD152-B676-476F-BD4A-A45DC7FC10D9}"/>
+          </ac:spMkLst>
+        </pc:spChg>
+        <pc:spChg chg="add mod">
+          <ac:chgData name="Andre Herrera" userId="8bb6a1e7bcbf12ca" providerId="LiveId" clId="{CBF77EC3-C0C9-485B-AE33-DDC2422FA287}" dt="2019-12-04T23:42:12.443" v="74" actId="1076"/>
+          <ac:spMkLst>
+            <pc:docMk/>
+            <pc:sldMk cId="3516692141" sldId="371"/>
+            <ac:spMk id="7" creationId="{BBC0E886-6CC5-4A73-A83B-B91FBD0F57BC}"/>
+          </ac:spMkLst>
+        </pc:spChg>
+        <pc:spChg chg="add del">
+          <ac:chgData name="Andre Herrera" userId="8bb6a1e7bcbf12ca" providerId="LiveId" clId="{CBF77EC3-C0C9-485B-AE33-DDC2422FA287}" dt="2019-12-04T23:51:16.563" v="79"/>
+          <ac:spMkLst>
+            <pc:docMk/>
+            <pc:sldMk cId="3516692141" sldId="371"/>
+            <ac:spMk id="8" creationId="{5A78A227-7902-471F-B04B-16D3D9CC015F}"/>
+          </ac:spMkLst>
+        </pc:spChg>
+        <pc:spChg chg="add del">
+          <ac:chgData name="Andre Herrera" userId="8bb6a1e7bcbf12ca" providerId="LiveId" clId="{CBF77EC3-C0C9-485B-AE33-DDC2422FA287}" dt="2019-12-04T23:51:20.118" v="81"/>
+          <ac:spMkLst>
+            <pc:docMk/>
+            <pc:sldMk cId="3516692141" sldId="371"/>
+            <ac:spMk id="9" creationId="{BD9D1ED6-2ACB-4862-8E4D-8529D7A830E7}"/>
+          </ac:spMkLst>
+        </pc:spChg>
+        <pc:graphicFrameChg chg="del">
+          <ac:chgData name="Andre Herrera" userId="8bb6a1e7bcbf12ca" providerId="LiveId" clId="{CBF77EC3-C0C9-485B-AE33-DDC2422FA287}" dt="2019-12-04T23:50:01.673" v="77" actId="478"/>
+          <ac:graphicFrameMkLst>
+            <pc:docMk/>
+            <pc:sldMk cId="3516692141" sldId="371"/>
+            <ac:graphicFrameMk id="5" creationId="{9019F82F-2E2E-4D0D-8297-87FA363782C7}"/>
+          </ac:graphicFrameMkLst>
+        </pc:graphicFrameChg>
+        <pc:graphicFrameChg chg="add">
+          <ac:chgData name="Andre Herrera" userId="8bb6a1e7bcbf12ca" providerId="LiveId" clId="{CBF77EC3-C0C9-485B-AE33-DDC2422FA287}" dt="2019-12-04T23:51:33.536" v="82"/>
+          <ac:graphicFrameMkLst>
+            <pc:docMk/>
+            <pc:sldMk cId="3516692141" sldId="371"/>
+            <ac:graphicFrameMk id="10" creationId="{8A4EF0F3-BC58-4F98-9535-24180C05E627}"/>
+          </ac:graphicFrameMkLst>
+        </pc:graphicFrameChg>
+      </pc:sldChg>
+      <pc:sldChg chg="addSp delSp modSp">
+        <pc:chgData name="Andre Herrera" userId="8bb6a1e7bcbf12ca" providerId="LiveId" clId="{CBF77EC3-C0C9-485B-AE33-DDC2422FA287}" dt="2019-12-05T00:06:55.644" v="408" actId="108"/>
+        <pc:sldMkLst>
+          <pc:docMk/>
+          <pc:sldMk cId="4252225560" sldId="372"/>
+        </pc:sldMkLst>
+        <pc:spChg chg="del mod">
+          <ac:chgData name="Andre Herrera" userId="8bb6a1e7bcbf12ca" providerId="LiveId" clId="{CBF77EC3-C0C9-485B-AE33-DDC2422FA287}" dt="2019-12-04T23:56:46.218" v="189" actId="478"/>
+          <ac:spMkLst>
+            <pc:docMk/>
+            <pc:sldMk cId="4252225560" sldId="372"/>
+            <ac:spMk id="3" creationId="{00000000-0000-0000-0000-000000000000}"/>
+          </ac:spMkLst>
+        </pc:spChg>
+        <pc:spChg chg="del mod">
+          <ac:chgData name="Andre Herrera" userId="8bb6a1e7bcbf12ca" providerId="LiveId" clId="{CBF77EC3-C0C9-485B-AE33-DDC2422FA287}" dt="2019-12-04T23:39:31.436" v="66" actId="478"/>
+          <ac:spMkLst>
+            <pc:docMk/>
+            <pc:sldMk cId="4252225560" sldId="372"/>
+            <ac:spMk id="4" creationId="{00000000-0000-0000-0000-000000000000}"/>
+          </ac:spMkLst>
+        </pc:spChg>
+        <pc:spChg chg="add del mod">
+          <ac:chgData name="Andre Herrera" userId="8bb6a1e7bcbf12ca" providerId="LiveId" clId="{CBF77EC3-C0C9-485B-AE33-DDC2422FA287}" dt="2019-12-04T23:33:32.544" v="42" actId="478"/>
+          <ac:spMkLst>
+            <pc:docMk/>
+            <pc:sldMk cId="4252225560" sldId="372"/>
+            <ac:spMk id="6" creationId="{2DAC3997-69F0-40AD-992A-EF65CC984B92}"/>
+          </ac:spMkLst>
+        </pc:spChg>
+        <pc:spChg chg="add mod">
+          <ac:chgData name="Andre Herrera" userId="8bb6a1e7bcbf12ca" providerId="LiveId" clId="{CBF77EC3-C0C9-485B-AE33-DDC2422FA287}" dt="2019-12-05T00:06:55.644" v="408" actId="108"/>
+          <ac:spMkLst>
+            <pc:docMk/>
+            <pc:sldMk cId="4252225560" sldId="372"/>
+            <ac:spMk id="9" creationId="{82326886-261E-4D28-9AE6-81C8DDB2AC9B}"/>
+          </ac:spMkLst>
+        </pc:spChg>
+        <pc:spChg chg="add mod">
+          <ac:chgData name="Andre Herrera" userId="8bb6a1e7bcbf12ca" providerId="LiveId" clId="{CBF77EC3-C0C9-485B-AE33-DDC2422FA287}" dt="2019-12-04T23:39:40.999" v="67" actId="1076"/>
+          <ac:spMkLst>
+            <pc:docMk/>
+            <pc:sldMk cId="4252225560" sldId="372"/>
+            <ac:spMk id="10" creationId="{36170E0D-FCCE-46C4-B087-8F612B7E72B0}"/>
+          </ac:spMkLst>
+        </pc:spChg>
+        <pc:spChg chg="add mod">
+          <ac:chgData name="Andre Herrera" userId="8bb6a1e7bcbf12ca" providerId="LiveId" clId="{CBF77EC3-C0C9-485B-AE33-DDC2422FA287}" dt="2019-12-04T23:56:46.218" v="189" actId="478"/>
+          <ac:spMkLst>
+            <pc:docMk/>
+            <pc:sldMk cId="4252225560" sldId="372"/>
+            <ac:spMk id="12" creationId="{06B0089A-8946-4C79-B41A-A1E707C420DF}"/>
+          </ac:spMkLst>
+        </pc:spChg>
+        <pc:picChg chg="add del mod">
+          <ac:chgData name="Andre Herrera" userId="8bb6a1e7bcbf12ca" providerId="LiveId" clId="{CBF77EC3-C0C9-485B-AE33-DDC2422FA287}" dt="2019-12-04T23:33:35.033" v="43" actId="478"/>
+          <ac:picMkLst>
+            <pc:docMk/>
+            <pc:sldMk cId="4252225560" sldId="372"/>
+            <ac:picMk id="2" creationId="{4E4B6D0E-DFE0-4F53-8193-A265598C91E1}"/>
+          </ac:picMkLst>
+        </pc:picChg>
+        <pc:picChg chg="add del">
+          <ac:chgData name="Andre Herrera" userId="8bb6a1e7bcbf12ca" providerId="LiveId" clId="{CBF77EC3-C0C9-485B-AE33-DDC2422FA287}" dt="2019-12-04T23:34:54.555" v="45" actId="478"/>
+          <ac:picMkLst>
+            <pc:docMk/>
+            <pc:sldMk cId="4252225560" sldId="372"/>
+            <ac:picMk id="7" creationId="{0FDC87E8-FB9F-4909-8105-CBA6DAB43BDB}"/>
+          </ac:picMkLst>
+        </pc:picChg>
+        <pc:picChg chg="add mod">
+          <ac:chgData name="Andre Herrera" userId="8bb6a1e7bcbf12ca" providerId="LiveId" clId="{CBF77EC3-C0C9-485B-AE33-DDC2422FA287}" dt="2019-12-04T23:58:55.960" v="251" actId="13822"/>
+          <ac:picMkLst>
+            <pc:docMk/>
+            <pc:sldMk cId="4252225560" sldId="372"/>
+            <ac:picMk id="8" creationId="{C4357EB2-853C-4A76-BCB3-7E73ED7E309C}"/>
+          </ac:picMkLst>
+        </pc:picChg>
+      </pc:sldChg>
+    </pc:docChg>
+  </pc:docChgLst>
+</pc:chgInfo>
+</file>
+
 <file path=ppt/notesMasters/notesMaster1.xml><?xml version="1.0" encoding="utf-8"?>
 <p:notesMaster xmlns:a="http://schemas.openxmlformats.org/drawingml/2006/main" xmlns:r="http://schemas.openxmlformats.org/officeDocument/2006/relationships" xmlns:p="http://schemas.openxmlformats.org/presentationml/2006/main">
   <p:cSld>
@@ -211,7 +464,7 @@
           <a:p>
             <a:fld id="{0AA11918-4594-DE4E-9D50-1A3B5A7A52B7}" type="datetimeFigureOut">
               <a:rPr lang="en-US" smtClean="0"/>
-              <a:t>11/3/2019</a:t>
+              <a:t>12/12/2019</a:t>
             </a:fld>
             <a:endParaRPr lang="en-US"/>
           </a:p>
@@ -541,7 +794,7 @@
               <a:defRPr/>
             </a:pPr>
             <a:r>
-              <a:rPr lang="en-US" dirty="0">
+              <a:rPr lang="en-US">
                 <a:solidFill>
                   <a:srgbClr val="116020"/>
                 </a:solidFill>
@@ -587,14 +840,14 @@
           </a:ln>
           <a:extLst>
             <a:ext uri="{909E8E84-426E-40dd-AFC4-6F175D3DCCD1}">
-              <a14:hiddenFill xmlns="" xmlns:a14="http://schemas.microsoft.com/office/drawing/2010/main">
+              <a14:hiddenFill xmlns:a14="http://schemas.microsoft.com/office/drawing/2010/main" xmlns="">
                 <a:solidFill>
                   <a:srgbClr val="FFFFFF"/>
                 </a:solidFill>
               </a14:hiddenFill>
             </a:ext>
             <a:ext uri="{91240B29-F687-4f45-9708-019B960494DF}">
-              <a14:hiddenLine xmlns="" xmlns:a14="http://schemas.microsoft.com/office/drawing/2010/main" w="9525">
+              <a14:hiddenLine xmlns:a14="http://schemas.microsoft.com/office/drawing/2010/main" xmlns="" w="9525">
                 <a:solidFill>
                   <a:srgbClr val="000000"/>
                 </a:solidFill>
@@ -756,9 +1009,9 @@
                 <a:latin typeface="Calibri"/>
               </a:rPr>
               <a:pPr/>
-              <a:t>11/3/2019</a:t>
+              <a:t>12/12/2019</a:t>
             </a:fld>
-            <a:endParaRPr lang="en-US" dirty="0">
+            <a:endParaRPr lang="en-US">
               <a:solidFill>
                 <a:prstClr val="black">
                   <a:tint val="75000"/>
@@ -792,7 +1045,7 @@
           <a:bodyPr/>
           <a:lstStyle/>
           <a:p>
-            <a:endParaRPr lang="en-US" dirty="0">
+            <a:endParaRPr lang="en-US">
               <a:solidFill>
                 <a:prstClr val="black">
                   <a:tint val="75000"/>
@@ -838,7 +1091,7 @@
               <a:pPr/>
               <a:t>‹#›</a:t>
             </a:fld>
-            <a:endParaRPr lang="en-US" dirty="0">
+            <a:endParaRPr lang="en-US">
               <a:solidFill>
                 <a:prstClr val="black">
                   <a:tint val="75000"/>
@@ -990,7 +1243,7 @@
                 </a:spcAft>
                 <a:defRPr/>
               </a:pPr>
-              <a:t>11/3/2019</a:t>
+              <a:t>12/12/2019</a:t>
             </a:fld>
             <a:endParaRPr lang="en-US">
               <a:solidFill>
@@ -1187,9 +1440,9 @@
                 <a:latin typeface="Calibri"/>
               </a:rPr>
               <a:pPr/>
-              <a:t>11/3/2019</a:t>
+              <a:t>12/12/2019</a:t>
             </a:fld>
-            <a:endParaRPr lang="en-US" dirty="0">
+            <a:endParaRPr lang="en-US">
               <a:solidFill>
                 <a:prstClr val="black">
                   <a:tint val="75000"/>
@@ -1223,7 +1476,7 @@
           <a:bodyPr/>
           <a:lstStyle/>
           <a:p>
-            <a:endParaRPr lang="en-US" dirty="0">
+            <a:endParaRPr lang="en-US">
               <a:solidFill>
                 <a:prstClr val="black">
                   <a:tint val="75000"/>
@@ -1269,7 +1522,7 @@
               <a:pPr/>
               <a:t>‹#›</a:t>
             </a:fld>
-            <a:endParaRPr lang="en-US" dirty="0">
+            <a:endParaRPr lang="en-US">
               <a:solidFill>
                 <a:prstClr val="black">
                   <a:tint val="75000"/>
@@ -1343,9 +1596,9 @@
                 <a:latin typeface="Calibri"/>
               </a:rPr>
               <a:pPr/>
-              <a:t>11/3/2019</a:t>
+              <a:t>12/12/2019</a:t>
             </a:fld>
-            <a:endParaRPr lang="en-US" dirty="0">
+            <a:endParaRPr lang="en-US">
               <a:solidFill>
                 <a:prstClr val="black">
                   <a:tint val="75000"/>
@@ -1379,7 +1632,7 @@
           <a:bodyPr/>
           <a:lstStyle/>
           <a:p>
-            <a:endParaRPr lang="en-US" dirty="0">
+            <a:endParaRPr lang="en-US">
               <a:solidFill>
                 <a:prstClr val="black">
                   <a:tint val="75000"/>
@@ -1425,7 +1678,7 @@
               <a:pPr/>
               <a:t>‹#›</a:t>
             </a:fld>
-            <a:endParaRPr lang="en-US" dirty="0">
+            <a:endParaRPr lang="en-US">
               <a:solidFill>
                 <a:prstClr val="black">
                   <a:tint val="75000"/>
@@ -1514,7 +1767,7 @@
             <a:pPr algn="ctr">
               <a:defRPr/>
             </a:pPr>
-            <a:endParaRPr lang="en-US" dirty="0">
+            <a:endParaRPr lang="en-US">
               <a:solidFill>
                 <a:srgbClr val="116020"/>
               </a:solidFill>
@@ -1547,14 +1800,14 @@
           </a:ln>
           <a:extLst>
             <a:ext uri="{909E8E84-426E-40dd-AFC4-6F175D3DCCD1}">
-              <a14:hiddenFill xmlns="" xmlns:a14="http://schemas.microsoft.com/office/drawing/2010/main">
+              <a14:hiddenFill xmlns:a14="http://schemas.microsoft.com/office/drawing/2010/main" xmlns="">
                 <a:solidFill>
                   <a:srgbClr val="FFFFFF"/>
                 </a:solidFill>
               </a14:hiddenFill>
             </a:ext>
             <a:ext uri="{91240B29-F687-4f45-9708-019B960494DF}">
-              <a14:hiddenLine xmlns="" xmlns:a14="http://schemas.microsoft.com/office/drawing/2010/main" w="9525">
+              <a14:hiddenLine xmlns:a14="http://schemas.microsoft.com/office/drawing/2010/main" xmlns="" w="9525">
                 <a:solidFill>
                   <a:srgbClr val="000000"/>
                 </a:solidFill>
@@ -1564,7 +1817,7 @@
               </a14:hiddenLine>
             </a:ext>
             <a:ext uri="{FAA26D3D-D897-4be2-8F04-BA451C77F1D7}">
-              <ma14:placeholderFlag xmlns="" xmlns:ma14="http://schemas.microsoft.com/office/mac/drawingml/2011/main" val="1"/>
+              <ma14:placeholderFlag xmlns:ma14="http://schemas.microsoft.com/office/mac/drawingml/2011/main" xmlns="" val="1"/>
             </a:ext>
           </a:extLst>
         </p:spPr>
@@ -1578,21 +1831,21 @@
           <a:p>
             <a:pPr lvl="0"/>
             <a:r>
-              <a:rPr lang="en-US" dirty="0"/>
+              <a:rPr lang="en-US"/>
               <a:t>Click to edit Master text styles</a:t>
             </a:r>
           </a:p>
           <a:p>
             <a:pPr lvl="1"/>
             <a:r>
-              <a:rPr lang="en-US" dirty="0"/>
+              <a:rPr lang="en-US"/>
               <a:t>Second level</a:t>
             </a:r>
           </a:p>
           <a:p>
             <a:pPr lvl="2"/>
             <a:r>
-              <a:rPr lang="en-US" dirty="0"/>
+              <a:rPr lang="en-US"/>
               <a:t>Third level</a:t>
             </a:r>
           </a:p>
@@ -1641,7 +1894,7 @@
             <a:pPr algn="ctr">
               <a:defRPr/>
             </a:pPr>
-            <a:endParaRPr lang="en-US" dirty="0">
+            <a:endParaRPr lang="en-US">
               <a:solidFill>
                 <a:srgbClr val="116020"/>
               </a:solidFill>
@@ -1766,7 +2019,7 @@
             <a:pPr algn="r">
               <a:defRPr/>
             </a:pPr>
-            <a:endParaRPr lang="en-US" kern="0" spc="150" dirty="0">
+            <a:endParaRPr lang="en-US" kern="0" spc="150">
               <a:solidFill>
                 <a:srgbClr val="000000"/>
               </a:solidFill>
@@ -1822,7 +2075,7 @@
           <a:lstStyle/>
           <a:p>
             <a:r>
-              <a:rPr lang="en-US" sz="900" b="1" dirty="0">
+              <a:rPr lang="en-US" sz="900" b="1">
                 <a:solidFill>
                   <a:srgbClr val="116020"/>
                 </a:solidFill>
@@ -1831,7 +2084,7 @@
               <a:t>Fall 2018 :</a:t>
             </a:r>
             <a:r>
-              <a:rPr lang="en-US" sz="900" dirty="0">
+              <a:rPr lang="en-US" sz="900">
                 <a:solidFill>
                   <a:srgbClr val="116020"/>
                 </a:solidFill>
@@ -1840,7 +2093,7 @@
               <a:t> </a:t>
             </a:r>
             <a:r>
-              <a:rPr lang="en-US" sz="900" i="1" dirty="0">
+              <a:rPr lang="en-US" sz="900" i="1">
                 <a:solidFill>
                   <a:srgbClr val="116020"/>
                 </a:solidFill>
@@ -1848,7 +2101,7 @@
               </a:rPr>
               <a:t>Senior Design Project</a:t>
             </a:r>
-            <a:endParaRPr lang="en-US" sz="900" dirty="0">
+            <a:endParaRPr lang="en-US" sz="900">
               <a:solidFill>
                 <a:srgbClr val="116020"/>
               </a:solidFill>
@@ -2296,75 +2549,278 @@
           </a:bodyPr>
           <a:lstStyle/>
           <a:p>
-            <a:pPr marL="0" indent="0">
-              <a:buNone/>
-            </a:pPr>
-            <a:r>
-              <a:rPr lang="en-US" sz="1800" u="sng" dirty="0"/>
+            <a:pPr marL="0" indent="0"/>
+            <a:r>
+              <a:rPr lang="en-US" sz="1200" u="sng" dirty="0">
+                <a:ea typeface="ＭＳ Ｐゴシック"/>
+              </a:rPr>
               <a:t>Project Name:</a:t>
             </a:r>
-          </a:p>
-          <a:p>
-            <a:pPr marL="0" indent="0">
-              <a:buNone/>
-            </a:pPr>
-            <a:r>
-              <a:rPr lang="en-US" sz="1800" u="sng" dirty="0"/>
+            <a:r>
+              <a:rPr lang="en-US" sz="1200" dirty="0">
+                <a:ea typeface="ＭＳ Ｐゴシック"/>
+              </a:rPr>
+              <a:t> </a:t>
+            </a:r>
+            <a:r>
+              <a:rPr lang="en-US" sz="1200" i="1" dirty="0">
+                <a:solidFill>
+                  <a:srgbClr val="0000FF"/>
+                </a:solidFill>
+                <a:ea typeface="ＭＳ Ｐゴシック"/>
+              </a:rPr>
+              <a:t>Windows Packer/Loader</a:t>
+            </a:r>
+          </a:p>
+          <a:p>
+            <a:pPr marL="0" indent="0"/>
+            <a:r>
+              <a:rPr lang="en-US" sz="1200" u="sng" dirty="0">
+                <a:ea typeface="ＭＳ Ｐゴシック"/>
+              </a:rPr>
               <a:t>Team Name:</a:t>
             </a:r>
-          </a:p>
-          <a:p>
-            <a:pPr marL="0" indent="0">
-              <a:buNone/>
-            </a:pPr>
-            <a:r>
-              <a:rPr lang="en-US" sz="1800" u="sng" dirty="0"/>
+            <a:r>
+              <a:rPr lang="en-US" sz="1200" dirty="0">
+                <a:ea typeface="ＭＳ Ｐゴシック"/>
+              </a:rPr>
+              <a:t> </a:t>
+            </a:r>
+            <a:r>
+              <a:rPr lang="en-US" sz="1200" i="1" dirty="0">
+                <a:solidFill>
+                  <a:srgbClr val="0000FF"/>
+                </a:solidFill>
+                <a:ea typeface="ＭＳ Ｐゴシック"/>
+              </a:rPr>
+              <a:t>BluSh3ll</a:t>
+            </a:r>
+          </a:p>
+          <a:p>
+            <a:pPr marL="0" indent="0"/>
+            <a:r>
+              <a:rPr lang="en-US" sz="1200" u="sng" dirty="0">
+                <a:ea typeface="ＭＳ Ｐゴシック"/>
+              </a:rPr>
               <a:t>Deliverables:</a:t>
             </a:r>
-          </a:p>
-          <a:p>
-            <a:pPr marL="0" indent="0">
-              <a:buNone/>
-            </a:pPr>
-            <a:endParaRPr lang="en-US" sz="1800" u="sng" dirty="0"/>
-          </a:p>
-          <a:p>
-            <a:pPr marL="0" indent="0">
-              <a:buNone/>
-            </a:pPr>
-            <a:r>
-              <a:rPr lang="en-US" sz="1800" i="1" dirty="0">
+            <a:r>
+              <a:rPr lang="en-US" sz="1200" dirty="0">
+                <a:ea typeface="ＭＳ Ｐゴシック"/>
+              </a:rPr>
+              <a:t> </a:t>
+            </a:r>
+            <a:endParaRPr lang="en-US" sz="1200" dirty="0"/>
+          </a:p>
+          <a:p>
+            <a:pPr marL="0" lvl="0" indent="0"/>
+            <a:r>
+              <a:rPr lang="en-US" sz="1200" i="1" dirty="0">
                 <a:solidFill>
                   <a:srgbClr val="0000FF"/>
                 </a:solidFill>
               </a:rPr>
-              <a:t>(summarize semester deliverables (i.e. CLINs here) what is being delivered and when are they being delivered) </a:t>
-            </a:r>
-          </a:p>
-          <a:p>
-            <a:pPr marL="0" indent="0">
-              <a:buNone/>
-            </a:pPr>
-            <a:endParaRPr lang="en-US" sz="1800" i="1" u="sng" dirty="0"/>
-          </a:p>
-          <a:p>
-            <a:pPr marL="0" indent="0">
-              <a:buNone/>
-            </a:pPr>
+              <a:t>CLIN-1 	Customer Reporting “Quad -Pack” - </a:t>
+            </a:r>
+            <a:r>
+              <a:rPr lang="en-US" sz="1200" i="1" dirty="0">
+                <a:solidFill>
+                  <a:srgbClr val="000000"/>
+                </a:solidFill>
+              </a:rPr>
+              <a:t>?</a:t>
+            </a:r>
+          </a:p>
+          <a:p>
+            <a:pPr marL="0" lvl="0" indent="0"/>
+            <a:r>
+              <a:rPr lang="en-US" sz="1200" i="1" dirty="0">
+                <a:solidFill>
+                  <a:srgbClr val="0000FF"/>
+                </a:solidFill>
+              </a:rPr>
+              <a:t>CLIN-2 	Weekly Activity/Time Sheet – </a:t>
+            </a:r>
+            <a:r>
+              <a:rPr lang="en-US" sz="1200" i="1" dirty="0">
+                <a:solidFill>
+                  <a:srgbClr val="000000"/>
+                </a:solidFill>
+              </a:rPr>
+              <a:t>Due every Friday </a:t>
+            </a:r>
+          </a:p>
+          <a:p>
+            <a:pPr marL="0" lvl="0" indent="0"/>
+            <a:r>
+              <a:rPr lang="en-US" sz="1200" i="1" dirty="0">
+                <a:solidFill>
+                  <a:srgbClr val="0000FF"/>
+                </a:solidFill>
+              </a:rPr>
+              <a:t>CLIN-3 	Color Team Briefing – </a:t>
+            </a:r>
+            <a:r>
+              <a:rPr lang="en-US" sz="1200" i="1" dirty="0">
+                <a:solidFill>
+                  <a:srgbClr val="000000"/>
+                </a:solidFill>
+              </a:rPr>
+              <a:t>9/22/19</a:t>
+            </a:r>
+          </a:p>
+          <a:p>
+            <a:pPr marL="0" lvl="0" indent="0"/>
+            <a:r>
+              <a:rPr lang="en-US" sz="1200" i="1" dirty="0">
+                <a:solidFill>
+                  <a:srgbClr val="0000FF"/>
+                </a:solidFill>
+              </a:rPr>
+              <a:t>CLIN-4 	Proposal – </a:t>
+            </a:r>
+            <a:r>
+              <a:rPr lang="en-US" sz="1200" i="1" dirty="0">
+                <a:solidFill>
+                  <a:srgbClr val="000000"/>
+                </a:solidFill>
+              </a:rPr>
+              <a:t>10/18/19</a:t>
+            </a:r>
+          </a:p>
+          <a:p>
+            <a:pPr marL="0" lvl="0" indent="0"/>
+            <a:r>
+              <a:rPr lang="en-US" sz="1200" i="1" dirty="0">
+                <a:solidFill>
+                  <a:srgbClr val="0000FF"/>
+                </a:solidFill>
+              </a:rPr>
+              <a:t>CLIN-5 	Design Review Briefing </a:t>
+            </a:r>
+            <a:r>
+              <a:rPr lang="en-US" sz="1200" i="1" dirty="0">
+                <a:solidFill>
+                  <a:srgbClr val="000000"/>
+                </a:solidFill>
+              </a:rPr>
+              <a:t>– 12/1/19</a:t>
+            </a:r>
+          </a:p>
+          <a:p>
+            <a:pPr marL="0" lvl="0" indent="0"/>
+            <a:r>
+              <a:rPr lang="en-US" sz="1200" i="1" dirty="0">
+                <a:solidFill>
+                  <a:srgbClr val="0000FF"/>
+                </a:solidFill>
+              </a:rPr>
+              <a:t>CLIN-6 	Poster Paper – </a:t>
+            </a:r>
+            <a:r>
+              <a:rPr lang="en-US" sz="1200" i="1" dirty="0">
+                <a:solidFill>
+                  <a:srgbClr val="000000"/>
+                </a:solidFill>
+              </a:rPr>
+              <a:t>Next Semester</a:t>
+            </a:r>
+          </a:p>
+          <a:p>
+            <a:pPr marL="0" lvl="0" indent="0"/>
+            <a:r>
+              <a:rPr lang="en-US" sz="1200" i="1" dirty="0">
+                <a:solidFill>
+                  <a:srgbClr val="0000FF"/>
+                </a:solidFill>
+              </a:rPr>
+              <a:t>CLIN-7 	Encryption and Compression Design and Techniques Report – </a:t>
+            </a:r>
+            <a:r>
+              <a:rPr lang="en-US" sz="1200" i="1" dirty="0">
+                <a:solidFill>
+                  <a:srgbClr val="000000"/>
+                </a:solidFill>
+              </a:rPr>
+              <a:t>Next Semester</a:t>
+            </a:r>
+          </a:p>
+          <a:p>
+            <a:pPr marL="0" lvl="0" indent="0"/>
+            <a:r>
+              <a:rPr lang="en-US" sz="1200" i="1" dirty="0">
+                <a:solidFill>
+                  <a:srgbClr val="0000FF"/>
+                </a:solidFill>
+              </a:rPr>
+              <a:t>CLIN-8 	Final Report and Team Presentation –</a:t>
+            </a:r>
+            <a:r>
+              <a:rPr lang="en-US" sz="1200" i="1" dirty="0">
+                <a:solidFill>
+                  <a:srgbClr val="000000"/>
+                </a:solidFill>
+              </a:rPr>
+              <a:t> End of Next Semester</a:t>
+            </a:r>
+          </a:p>
+          <a:p>
+            <a:pPr marL="0" lvl="0" indent="0"/>
+            <a:r>
+              <a:rPr lang="en-US" sz="1200" i="1" dirty="0">
+                <a:solidFill>
+                  <a:srgbClr val="0000FF"/>
+                </a:solidFill>
+              </a:rPr>
+              <a:t>CLIN-9 	Product Specifications - </a:t>
+            </a:r>
+            <a:r>
+              <a:rPr lang="en-US" sz="1200" i="1" dirty="0">
+                <a:solidFill>
+                  <a:srgbClr val="000000"/>
+                </a:solidFill>
+              </a:rPr>
+              <a:t>?</a:t>
+            </a:r>
+          </a:p>
+          <a:p>
+            <a:pPr marL="0" lvl="0" indent="0"/>
+            <a:r>
+              <a:rPr lang="en-US" sz="1200" i="1" dirty="0">
+                <a:solidFill>
+                  <a:srgbClr val="0000FF"/>
+                </a:solidFill>
+              </a:rPr>
+              <a:t>CLIN-10 	Packer/Loader Source Code and Completed/Compiled Tool – </a:t>
+            </a:r>
+            <a:r>
+              <a:rPr lang="en-US" sz="1200" i="1" dirty="0">
+                <a:solidFill>
+                  <a:srgbClr val="000000"/>
+                </a:solidFill>
+              </a:rPr>
+              <a:t>Week 20</a:t>
+            </a:r>
+          </a:p>
+          <a:p>
+            <a:pPr marL="0" lvl="0" indent="0"/>
+            <a:r>
+              <a:rPr lang="en-US" sz="1200" i="1" dirty="0">
+                <a:solidFill>
+                  <a:srgbClr val="000000"/>
+                </a:solidFill>
+              </a:rPr>
+              <a:t> </a:t>
+            </a:r>
             <a:r>
               <a:rPr lang="en-US" sz="1800" u="sng" dirty="0"/>
               <a:t>Key Accomplishments: </a:t>
             </a:r>
           </a:p>
           <a:p>
-            <a:pPr marL="0" indent="0">
-              <a:buNone/>
-            </a:pPr>
-            <a:endParaRPr lang="en-US" sz="1800" u="sng" dirty="0"/>
-          </a:p>
-          <a:p>
-            <a:pPr marL="0" indent="0">
-              <a:buNone/>
+            <a:pPr marL="285750" indent="-285750">
+              <a:buFont typeface="Arial" panose="020B0604020202020204" pitchFamily="34" charset="0"/>
+              <a:buChar char="•"/>
             </a:pPr>
             <a:r>
               <a:rPr lang="en-US" sz="1800" dirty="0">
@@ -2372,13 +2828,8 @@
                   <a:srgbClr val="0000FF"/>
                 </a:solidFill>
               </a:rPr>
-              <a:t>(summarize key accomplishments from last reporting period)</a:t>
-            </a:r>
-          </a:p>
-          <a:p>
-            <a:pPr marL="0" indent="0">
-              <a:buNone/>
-            </a:pPr>
+              <a:t>Sections of the packer are coded</a:t>
+            </a:r>
             <a:endParaRPr lang="en-US" sz="1800" u="sng" dirty="0">
               <a:solidFill>
                 <a:srgbClr val="0000FF"/>
@@ -2389,16 +2840,6 @@
             <a:pPr marL="0" indent="0">
               <a:buNone/>
             </a:pPr>
-            <a:endParaRPr lang="en-US" sz="1800" u="sng" dirty="0">
-              <a:solidFill>
-                <a:srgbClr val="0000FF"/>
-              </a:solidFill>
-            </a:endParaRPr>
-          </a:p>
-          <a:p>
-            <a:pPr marL="0" indent="0">
-              <a:buNone/>
-            </a:pPr>
             <a:r>
               <a:rPr lang="en-US" sz="1800" u="sng" dirty="0"/>
               <a:t>Issues:</a:t>
@@ -2413,17 +2854,23 @@
                   <a:srgbClr val="0000FF"/>
                 </a:solidFill>
               </a:rPr>
-              <a:t>(summarize problems that you are experiencing)</a:t>
-            </a:r>
-          </a:p>
-          <a:p>
-            <a:pPr marL="0" indent="0">
-              <a:buNone/>
-            </a:pPr>
+              <a:t>With finals approaching and having final assignments/projects due in classes we have had less time then we thought we would for this phase of development putting us </a:t>
+            </a:r>
+            <a:r>
+              <a:rPr lang="en-US" sz="1800">
+                <a:solidFill>
+                  <a:srgbClr val="0000FF"/>
+                </a:solidFill>
+              </a:rPr>
+              <a:t>behind schedule. </a:t>
+            </a:r>
             <a:endParaRPr lang="en-US" sz="1800" dirty="0">
               <a:solidFill>
                 <a:srgbClr val="0000FF"/>
               </a:solidFill>
+              <a:highlight>
+                <a:srgbClr val="FFFF00"/>
+              </a:highlight>
             </a:endParaRPr>
           </a:p>
           <a:p>
@@ -2436,7 +2883,7 @@
             </a:r>
             <a:r>
               <a:rPr lang="en-US" sz="1800" dirty="0"/>
-              <a:t>    </a:t>
+              <a:t>   </a:t>
             </a:r>
             <a:r>
               <a:rPr lang="en-US" sz="1800" dirty="0">
@@ -2444,24 +2891,24 @@
                   <a:srgbClr val="0000FF"/>
                 </a:solidFill>
               </a:rPr>
-              <a:t>(</a:t>
-            </a:r>
-            <a:r>
-              <a:rPr lang="en-US" sz="1800" i="1" dirty="0">
+              <a:t>1 ½ weeks behind schedule </a:t>
+            </a:r>
+          </a:p>
+          <a:p>
+            <a:pPr marL="0" indent="0">
+              <a:buNone/>
+            </a:pPr>
+            <a:r>
+              <a:rPr lang="en-US" sz="1800" u="sng" dirty="0"/>
+              <a:t>Cost Status: </a:t>
+            </a:r>
+            <a:r>
+              <a:rPr lang="en-US" sz="1800" dirty="0">
                 <a:solidFill>
                   <a:srgbClr val="0000FF"/>
                 </a:solidFill>
               </a:rPr>
-              <a:t>quantify ahead or behind schedule)</a:t>
-            </a:r>
-          </a:p>
-          <a:p>
-            <a:pPr marL="0" indent="0">
-              <a:buNone/>
-            </a:pPr>
-            <a:r>
-              <a:rPr lang="en-US" sz="1800" u="sng" dirty="0"/>
-              <a:t>Cost Status:</a:t>
+              <a:t>No monetary cost, 288 hours (270 predicted)</a:t>
             </a:r>
           </a:p>
           <a:p>
@@ -2495,7 +2942,7 @@
           <a:lstStyle/>
           <a:p>
             <a:r>
-              <a:rPr lang="en-US" sz="3600" dirty="0"/>
+              <a:rPr lang="en-US" sz="3600"/>
               <a:t>Executive Summary</a:t>
             </a:r>
           </a:p>
@@ -2510,7 +2957,7 @@
         <p:spPr>
           <a:xfrm>
             <a:off x="6467040" y="746753"/>
-            <a:ext cx="1840844" cy="369332"/>
+            <a:ext cx="1739772" cy="369332"/>
           </a:xfrm>
           <a:prstGeom prst="rect">
             <a:avLst/>
@@ -2525,8 +2972,13 @@
           <a:p>
             <a:r>
               <a:rPr lang="en-US" dirty="0"/>
-              <a:t>Date:__________</a:t>
-            </a:r>
+              <a:t>Date: </a:t>
+            </a:r>
+            <a:r>
+              <a:rPr lang="en-US" u="sng" dirty="0"/>
+              <a:t>12/4/2019</a:t>
+            </a:r>
+            <a:endParaRPr lang="en-US" dirty="0"/>
           </a:p>
         </p:txBody>
       </p:sp>
@@ -2588,6 +3040,9 @@
             </a:r>
           </a:p>
           <a:p>
+            <a:endParaRPr lang="en-US" sz="2000" u="sng" dirty="0"/>
+          </a:p>
+          <a:p>
             <a:pPr marL="457200" lvl="1" indent="0">
               <a:buNone/>
             </a:pPr>
@@ -2600,68 +3055,86 @@
             <a:endParaRPr lang="en-US" sz="2000" u="sng" dirty="0"/>
           </a:p>
           <a:p>
-            <a:pPr marL="457200" lvl="1" indent="0">
-              <a:buNone/>
+            <a:endParaRPr lang="en-US" sz="2000" u="sng" dirty="0"/>
+          </a:p>
+          <a:p>
+            <a:endParaRPr lang="en-US" sz="2000" u="sng" dirty="0"/>
+          </a:p>
+          <a:p>
+            <a:endParaRPr lang="en-US" sz="2000" u="sng" dirty="0"/>
+          </a:p>
+          <a:p>
+            <a:endParaRPr lang="en-US" sz="2000" u="sng" dirty="0"/>
+          </a:p>
+          <a:p>
+            <a:r>
+              <a:rPr lang="en-US" sz="2000" u="sng" dirty="0"/>
+              <a:t>Return to “Green”</a:t>
+            </a:r>
+          </a:p>
+          <a:p>
+            <a:pPr marL="285750" indent="-285750">
+              <a:buFont typeface="Arial" panose="020B0604020202020204" pitchFamily="34" charset="0"/>
+              <a:buChar char="•"/>
             </a:pPr>
-            <a:endParaRPr lang="en-US" sz="2000" u="sng" dirty="0"/>
-          </a:p>
-          <a:p>
-            <a:r>
-              <a:rPr lang="en-US" sz="2000" u="sng" dirty="0"/>
-              <a:t>Return to “Green” Plan (if Issues)”</a:t>
-            </a:r>
-          </a:p>
-          <a:p>
-            <a:pPr marL="0" indent="0">
-              <a:buNone/>
-            </a:pPr>
-            <a:r>
-              <a:rPr lang="en-US" sz="2000" i="1" dirty="0">
+            <a:r>
+              <a:rPr lang="en-US" sz="1500" dirty="0">
                 <a:solidFill>
                   <a:srgbClr val="0000FF"/>
                 </a:solidFill>
               </a:rPr>
-              <a:t>				</a:t>
-            </a:r>
-          </a:p>
-          <a:p>
-            <a:pPr marL="0" indent="0">
-              <a:buNone/>
+              <a:t>If issues occur this semester, we will allocate more time to work during winter break</a:t>
+            </a:r>
+          </a:p>
+          <a:p>
+            <a:pPr marL="285750" indent="-285750">
+              <a:buFont typeface="Arial" panose="020B0604020202020204" pitchFamily="34" charset="0"/>
+              <a:buChar char="•"/>
             </a:pPr>
             <a:r>
-              <a:rPr lang="en-US" sz="2000" i="1" dirty="0">
+              <a:rPr lang="en-US" sz="1500" dirty="0">
                 <a:solidFill>
                   <a:srgbClr val="0000FF"/>
                 </a:solidFill>
               </a:rPr>
-              <a:t>		(summarize your plan to resolve your issues)</a:t>
-            </a:r>
-          </a:p>
-          <a:p>
-            <a:pPr marL="0" indent="0">
-              <a:buNone/>
-            </a:pPr>
-            <a:endParaRPr lang="en-US" sz="2000" i="1" dirty="0">
+              <a:t>If issues occur next semester, we will cut back on the testing and development phase to allocate more time to fix issues</a:t>
+            </a:r>
+            <a:endParaRPr lang="en-US" sz="1500" u="sng" dirty="0">
               <a:solidFill>
                 <a:srgbClr val="0000FF"/>
               </a:solidFill>
             </a:endParaRPr>
           </a:p>
           <a:p>
-            <a:pPr marL="0" indent="0">
-              <a:buNone/>
+            <a:r>
+              <a:rPr lang="en-US" sz="2000" u="sng" dirty="0"/>
+              <a:t>Plans for Next Reporting Period:</a:t>
+            </a:r>
+          </a:p>
+          <a:p>
+            <a:pPr marL="285750" indent="-285750">
+              <a:buFont typeface="Arial" panose="020B0604020202020204" pitchFamily="34" charset="0"/>
+              <a:buChar char="•"/>
             </a:pPr>
-            <a:endParaRPr lang="en-US" sz="2000" i="1" u="sng" dirty="0">
+            <a:r>
+              <a:rPr lang="en-US" sz="1500" dirty="0">
+                <a:solidFill>
+                  <a:srgbClr val="0000FF"/>
+                </a:solidFill>
+              </a:rPr>
+              <a:t>Complete 3.1-3.4</a:t>
+            </a:r>
+          </a:p>
+          <a:p>
+            <a:pPr marL="285750" indent="-285750">
+              <a:buFont typeface="Arial" panose="020B0604020202020204" pitchFamily="34" charset="0"/>
+              <a:buChar char="•"/>
+            </a:pPr>
+            <a:endParaRPr lang="en-US" sz="1500" dirty="0">
               <a:solidFill>
                 <a:srgbClr val="0000FF"/>
               </a:solidFill>
             </a:endParaRPr>
-          </a:p>
-          <a:p>
-            <a:r>
-              <a:rPr lang="en-US" sz="2000" u="sng" dirty="0"/>
-              <a:t>Plans for Next Reporting Period:</a:t>
-            </a:r>
           </a:p>
           <a:p>
             <a:pPr marL="457200" lvl="1" indent="0">
@@ -2708,7 +3181,7 @@
           <a:lstStyle/>
           <a:p>
             <a:r>
-              <a:rPr lang="en-US" sz="3600" dirty="0"/>
+              <a:rPr lang="en-US" sz="3600"/>
               <a:t>Issues/Future Plans</a:t>
             </a:r>
           </a:p>
@@ -2716,14 +3189,62 @@
       </p:sp>
       <p:sp>
         <p:nvSpPr>
-          <p:cNvPr id="4" name="TextBox 3"/>
+          <p:cNvPr id="6" name="Footer Placeholder 5">
+            <a:extLst>
+              <a:ext uri="{FF2B5EF4-FFF2-40B4-BE49-F238E27FC236}">
+                <a16:creationId xmlns:a16="http://schemas.microsoft.com/office/drawing/2014/main" id="{A23D8548-033B-4F8C-A398-8EB89B7F9031}"/>
+              </a:ext>
+            </a:extLst>
+          </p:cNvPr>
+          <p:cNvSpPr>
+            <a:spLocks noGrp="1"/>
+          </p:cNvSpPr>
+          <p:nvPr>
+            <p:ph type="ftr" sz="quarter" idx="11"/>
+          </p:nvPr>
+        </p:nvSpPr>
+        <p:spPr/>
+        <p:txBody>
+          <a:bodyPr/>
+          <a:lstStyle/>
+          <a:p>
+            <a:endParaRPr lang="en-US">
+              <a:solidFill>
+                <a:prstClr val="black">
+                  <a:tint val="75000"/>
+                </a:prstClr>
+              </a:solidFill>
+              <a:latin typeface="Calibri"/>
+            </a:endParaRPr>
+          </a:p>
+          <a:p>
+            <a:endParaRPr lang="en-US">
+              <a:solidFill>
+                <a:prstClr val="black">
+                  <a:tint val="75000"/>
+                </a:prstClr>
+              </a:solidFill>
+              <a:latin typeface="Calibri"/>
+            </a:endParaRPr>
+          </a:p>
+        </p:txBody>
+      </p:sp>
+      <p:sp>
+        <p:nvSpPr>
+          <p:cNvPr id="7" name="TextBox 6">
+            <a:extLst>
+              <a:ext uri="{FF2B5EF4-FFF2-40B4-BE49-F238E27FC236}">
+                <a16:creationId xmlns:a16="http://schemas.microsoft.com/office/drawing/2014/main" id="{BBC0E886-6CC5-4A73-A83B-B91FBD0F57BC}"/>
+              </a:ext>
+            </a:extLst>
+          </p:cNvPr>
           <p:cNvSpPr txBox="1"/>
           <p:nvPr/>
         </p:nvSpPr>
         <p:spPr>
           <a:xfrm>
-            <a:off x="6591125" y="622676"/>
-            <a:ext cx="1840844" cy="369332"/>
+            <a:off x="6591124" y="608253"/>
+            <a:ext cx="1739772" cy="369332"/>
           </a:xfrm>
           <a:prstGeom prst="rect">
             <a:avLst/>
@@ -2738,11 +3259,3034 @@
           <a:p>
             <a:r>
               <a:rPr lang="en-US" dirty="0"/>
-              <a:t>Date:__________</a:t>
-            </a:r>
+              <a:t>Date: </a:t>
+            </a:r>
+            <a:r>
+              <a:rPr lang="en-US" u="sng" dirty="0"/>
+              <a:t>12/4/2019</a:t>
+            </a:r>
+            <a:endParaRPr lang="en-US" dirty="0"/>
           </a:p>
         </p:txBody>
       </p:sp>
+      <p:graphicFrame>
+        <p:nvGraphicFramePr>
+          <p:cNvPr id="10" name="Table 9">
+            <a:extLst>
+              <a:ext uri="{FF2B5EF4-FFF2-40B4-BE49-F238E27FC236}">
+                <a16:creationId xmlns:a16="http://schemas.microsoft.com/office/drawing/2014/main" id="{8A4EF0F3-BC58-4F98-9535-24180C05E627}"/>
+              </a:ext>
+            </a:extLst>
+          </p:cNvPr>
+          <p:cNvGraphicFramePr>
+            <a:graphicFrameLocks noGrp="1"/>
+          </p:cNvGraphicFramePr>
+          <p:nvPr>
+            <p:extLst>
+              <p:ext uri="{D42A27DB-BD31-4B8C-83A1-F6EECF244321}">
+                <p14:modId xmlns:p14="http://schemas.microsoft.com/office/powerpoint/2010/main" val="3624584879"/>
+              </p:ext>
+            </p:extLst>
+          </p:nvPr>
+        </p:nvGraphicFramePr>
+        <p:xfrm>
+          <a:off x="489875" y="1554102"/>
+          <a:ext cx="7841021" cy="2609334"/>
+        </p:xfrm>
+        <a:graphic>
+          <a:graphicData uri="http://schemas.openxmlformats.org/drawingml/2006/table">
+            <a:tbl>
+              <a:tblPr>
+                <a:tableStyleId>{5C22544A-7EE6-4342-B048-85BDC9FD1C3A}</a:tableStyleId>
+              </a:tblPr>
+              <a:tblGrid>
+                <a:gridCol w="214124">
+                  <a:extLst>
+                    <a:ext uri="{9D8B030D-6E8A-4147-A177-3AD203B41FA5}">
+                      <a16:colId xmlns:a16="http://schemas.microsoft.com/office/drawing/2014/main" val="671418013"/>
+                    </a:ext>
+                  </a:extLst>
+                </a:gridCol>
+                <a:gridCol w="1723189">
+                  <a:extLst>
+                    <a:ext uri="{9D8B030D-6E8A-4147-A177-3AD203B41FA5}">
+                      <a16:colId xmlns:a16="http://schemas.microsoft.com/office/drawing/2014/main" val="3523765146"/>
+                    </a:ext>
+                  </a:extLst>
+                </a:gridCol>
+                <a:gridCol w="3538146">
+                  <a:extLst>
+                    <a:ext uri="{9D8B030D-6E8A-4147-A177-3AD203B41FA5}">
+                      <a16:colId xmlns:a16="http://schemas.microsoft.com/office/drawing/2014/main" val="2081966058"/>
+                    </a:ext>
+                  </a:extLst>
+                </a:gridCol>
+                <a:gridCol w="652569">
+                  <a:extLst>
+                    <a:ext uri="{9D8B030D-6E8A-4147-A177-3AD203B41FA5}">
+                      <a16:colId xmlns:a16="http://schemas.microsoft.com/office/drawing/2014/main" val="2284990309"/>
+                    </a:ext>
+                  </a:extLst>
+                </a:gridCol>
+                <a:gridCol w="621980">
+                  <a:extLst>
+                    <a:ext uri="{9D8B030D-6E8A-4147-A177-3AD203B41FA5}">
+                      <a16:colId xmlns:a16="http://schemas.microsoft.com/office/drawing/2014/main" val="812472574"/>
+                    </a:ext>
+                  </a:extLst>
+                </a:gridCol>
+                <a:gridCol w="621980">
+                  <a:extLst>
+                    <a:ext uri="{9D8B030D-6E8A-4147-A177-3AD203B41FA5}">
+                      <a16:colId xmlns:a16="http://schemas.microsoft.com/office/drawing/2014/main" val="264275889"/>
+                    </a:ext>
+                  </a:extLst>
+                </a:gridCol>
+                <a:gridCol w="469033">
+                  <a:extLst>
+                    <a:ext uri="{9D8B030D-6E8A-4147-A177-3AD203B41FA5}">
+                      <a16:colId xmlns:a16="http://schemas.microsoft.com/office/drawing/2014/main" val="2548966086"/>
+                    </a:ext>
+                  </a:extLst>
+                </a:gridCol>
+              </a:tblGrid>
+              <a:tr h="143117">
+                <a:tc>
+                  <a:txBody>
+                    <a:bodyPr/>
+                    <a:lstStyle/>
+                    <a:p>
+                      <a:pPr algn="ctr" fontAlgn="ctr"/>
+                      <a:r>
+                        <a:rPr lang="en-US" sz="900" u="none" strike="noStrike">
+                          <a:effectLst/>
+                        </a:rPr>
+                        <a:t>ID</a:t>
+                      </a:r>
+                      <a:endParaRPr lang="en-US" sz="900" b="1" i="0" u="none" strike="noStrike">
+                        <a:solidFill>
+                          <a:srgbClr val="000000"/>
+                        </a:solidFill>
+                        <a:effectLst/>
+                        <a:latin typeface="Calibri" panose="020F0502020204030204" pitchFamily="34" charset="0"/>
+                      </a:endParaRPr>
+                    </a:p>
+                  </a:txBody>
+                  <a:tcPr marL="7803" marR="7803" marT="7803" marB="0" anchor="ctr"/>
+                </a:tc>
+                <a:tc>
+                  <a:txBody>
+                    <a:bodyPr/>
+                    <a:lstStyle/>
+                    <a:p>
+                      <a:pPr algn="ctr" fontAlgn="ctr"/>
+                      <a:r>
+                        <a:rPr lang="en-US" sz="900" u="none" strike="noStrike">
+                          <a:effectLst/>
+                        </a:rPr>
+                        <a:t>Activity</a:t>
+                      </a:r>
+                      <a:endParaRPr lang="en-US" sz="900" b="1" i="0" u="none" strike="noStrike">
+                        <a:solidFill>
+                          <a:srgbClr val="000000"/>
+                        </a:solidFill>
+                        <a:effectLst/>
+                        <a:latin typeface="Calibri" panose="020F0502020204030204" pitchFamily="34" charset="0"/>
+                      </a:endParaRPr>
+                    </a:p>
+                  </a:txBody>
+                  <a:tcPr marL="7803" marR="7803" marT="7803" marB="0" anchor="ctr"/>
+                </a:tc>
+                <a:tc>
+                  <a:txBody>
+                    <a:bodyPr/>
+                    <a:lstStyle/>
+                    <a:p>
+                      <a:pPr algn="ctr" fontAlgn="ctr"/>
+                      <a:r>
+                        <a:rPr lang="en-US" sz="900" u="none" strike="noStrike">
+                          <a:effectLst/>
+                        </a:rPr>
+                        <a:t>Description</a:t>
+                      </a:r>
+                      <a:endParaRPr lang="en-US" sz="900" b="1" i="0" u="none" strike="noStrike">
+                        <a:solidFill>
+                          <a:srgbClr val="000000"/>
+                        </a:solidFill>
+                        <a:effectLst/>
+                        <a:latin typeface="Calibri" panose="020F0502020204030204" pitchFamily="34" charset="0"/>
+                      </a:endParaRPr>
+                    </a:p>
+                  </a:txBody>
+                  <a:tcPr marL="7803" marR="7803" marT="7803" marB="0" anchor="ctr"/>
+                </a:tc>
+                <a:tc>
+                  <a:txBody>
+                    <a:bodyPr/>
+                    <a:lstStyle/>
+                    <a:p>
+                      <a:pPr algn="ctr" fontAlgn="ctr"/>
+                      <a:r>
+                        <a:rPr lang="en-US" sz="900" u="none" strike="noStrike">
+                          <a:effectLst/>
+                        </a:rPr>
+                        <a:t>Deliverables</a:t>
+                      </a:r>
+                      <a:endParaRPr lang="en-US" sz="900" b="1" i="0" u="none" strike="noStrike">
+                        <a:solidFill>
+                          <a:srgbClr val="000000"/>
+                        </a:solidFill>
+                        <a:effectLst/>
+                        <a:latin typeface="Calibri" panose="020F0502020204030204" pitchFamily="34" charset="0"/>
+                      </a:endParaRPr>
+                    </a:p>
+                  </a:txBody>
+                  <a:tcPr marL="7803" marR="7803" marT="7803" marB="0" anchor="ctr"/>
+                </a:tc>
+                <a:tc>
+                  <a:txBody>
+                    <a:bodyPr/>
+                    <a:lstStyle/>
+                    <a:p>
+                      <a:pPr algn="ctr" fontAlgn="ctr"/>
+                      <a:r>
+                        <a:rPr lang="en-US" sz="900" u="none" strike="noStrike">
+                          <a:effectLst/>
+                        </a:rPr>
+                        <a:t>Start</a:t>
+                      </a:r>
+                      <a:endParaRPr lang="en-US" sz="900" b="1" i="0" u="none" strike="noStrike">
+                        <a:solidFill>
+                          <a:srgbClr val="000000"/>
+                        </a:solidFill>
+                        <a:effectLst/>
+                        <a:latin typeface="Calibri" panose="020F0502020204030204" pitchFamily="34" charset="0"/>
+                      </a:endParaRPr>
+                    </a:p>
+                  </a:txBody>
+                  <a:tcPr marL="7803" marR="7803" marT="7803" marB="0" anchor="ctr"/>
+                </a:tc>
+                <a:tc>
+                  <a:txBody>
+                    <a:bodyPr/>
+                    <a:lstStyle/>
+                    <a:p>
+                      <a:pPr algn="ctr" fontAlgn="ctr"/>
+                      <a:r>
+                        <a:rPr lang="en-US" sz="900" u="none" strike="noStrike">
+                          <a:effectLst/>
+                        </a:rPr>
+                        <a:t>Finish</a:t>
+                      </a:r>
+                      <a:endParaRPr lang="en-US" sz="900" b="1" i="0" u="none" strike="noStrike">
+                        <a:solidFill>
+                          <a:srgbClr val="000000"/>
+                        </a:solidFill>
+                        <a:effectLst/>
+                        <a:latin typeface="Calibri" panose="020F0502020204030204" pitchFamily="34" charset="0"/>
+                      </a:endParaRPr>
+                    </a:p>
+                  </a:txBody>
+                  <a:tcPr marL="7803" marR="7803" marT="7803" marB="0" anchor="ctr"/>
+                </a:tc>
+                <a:tc>
+                  <a:txBody>
+                    <a:bodyPr/>
+                    <a:lstStyle/>
+                    <a:p>
+                      <a:pPr algn="ctr" fontAlgn="ctr"/>
+                      <a:r>
+                        <a:rPr lang="en-US" sz="900" u="none" strike="noStrike">
+                          <a:effectLst/>
+                        </a:rPr>
+                        <a:t>Duration</a:t>
+                      </a:r>
+                      <a:endParaRPr lang="en-US" sz="900" b="1" i="0" u="none" strike="noStrike">
+                        <a:solidFill>
+                          <a:srgbClr val="000000"/>
+                        </a:solidFill>
+                        <a:effectLst/>
+                        <a:latin typeface="Calibri" panose="020F0502020204030204" pitchFamily="34" charset="0"/>
+                      </a:endParaRPr>
+                    </a:p>
+                  </a:txBody>
+                  <a:tcPr marL="7803" marR="7803" marT="7803" marB="0" anchor="ctr"/>
+                </a:tc>
+                <a:extLst>
+                  <a:ext uri="{0D108BD9-81ED-4DB2-BD59-A6C34878D82A}">
+                    <a16:rowId xmlns:a16="http://schemas.microsoft.com/office/drawing/2014/main" val="1985942284"/>
+                  </a:ext>
+                </a:extLst>
+              </a:tr>
+              <a:tr h="143117">
+                <a:tc>
+                  <a:txBody>
+                    <a:bodyPr/>
+                    <a:lstStyle/>
+                    <a:p>
+                      <a:pPr algn="ctr" fontAlgn="ctr"/>
+                      <a:r>
+                        <a:rPr lang="en-US" sz="900" u="none" strike="noStrike">
+                          <a:effectLst/>
+                        </a:rPr>
+                        <a:t>1</a:t>
+                      </a:r>
+                      <a:endParaRPr lang="en-US" sz="900" b="1" i="0" u="none" strike="noStrike">
+                        <a:solidFill>
+                          <a:srgbClr val="000000"/>
+                        </a:solidFill>
+                        <a:effectLst/>
+                        <a:latin typeface="Calibri" panose="020F0502020204030204" pitchFamily="34" charset="0"/>
+                      </a:endParaRPr>
+                    </a:p>
+                  </a:txBody>
+                  <a:tcPr marL="7803" marR="7803" marT="7803" marB="0" anchor="ctr"/>
+                </a:tc>
+                <a:tc>
+                  <a:txBody>
+                    <a:bodyPr/>
+                    <a:lstStyle/>
+                    <a:p>
+                      <a:pPr algn="l" fontAlgn="ctr"/>
+                      <a:r>
+                        <a:rPr lang="en-US" sz="900" u="none" strike="noStrike">
+                          <a:effectLst/>
+                        </a:rPr>
+                        <a:t>Requirements</a:t>
+                      </a:r>
+                      <a:endParaRPr lang="en-US" sz="900" b="1" i="0" u="none" strike="noStrike">
+                        <a:solidFill>
+                          <a:srgbClr val="000000"/>
+                        </a:solidFill>
+                        <a:effectLst/>
+                        <a:latin typeface="Calibri" panose="020F0502020204030204" pitchFamily="34" charset="0"/>
+                      </a:endParaRPr>
+                    </a:p>
+                  </a:txBody>
+                  <a:tcPr marL="7803" marR="7803" marT="7803" marB="0" anchor="ctr"/>
+                </a:tc>
+                <a:tc>
+                  <a:txBody>
+                    <a:bodyPr/>
+                    <a:lstStyle/>
+                    <a:p>
+                      <a:pPr algn="l" fontAlgn="ctr"/>
+                      <a:r>
+                        <a:rPr lang="en-US" sz="900" u="none" strike="noStrike">
+                          <a:effectLst/>
+                        </a:rPr>
+                        <a:t>What does our customer need from the product?</a:t>
+                      </a:r>
+                      <a:endParaRPr lang="en-US" sz="900" b="0" i="0" u="none" strike="noStrike">
+                        <a:solidFill>
+                          <a:srgbClr val="000000"/>
+                        </a:solidFill>
+                        <a:effectLst/>
+                        <a:latin typeface="Calibri" panose="020F0502020204030204" pitchFamily="34" charset="0"/>
+                      </a:endParaRPr>
+                    </a:p>
+                  </a:txBody>
+                  <a:tcPr marL="7803" marR="7803" marT="7803" marB="0" anchor="ctr"/>
+                </a:tc>
+                <a:tc>
+                  <a:txBody>
+                    <a:bodyPr/>
+                    <a:lstStyle/>
+                    <a:p>
+                      <a:pPr algn="ctr" fontAlgn="ctr"/>
+                      <a:r>
+                        <a:rPr lang="en-US" sz="900" u="none" strike="noStrike">
+                          <a:effectLst/>
+                        </a:rPr>
+                        <a:t>T00, T01, T02</a:t>
+                      </a:r>
+                      <a:endParaRPr lang="en-US" sz="900" b="0" i="0" u="none" strike="noStrike">
+                        <a:solidFill>
+                          <a:srgbClr val="000000"/>
+                        </a:solidFill>
+                        <a:effectLst/>
+                        <a:latin typeface="Calibri" panose="020F0502020204030204" pitchFamily="34" charset="0"/>
+                      </a:endParaRPr>
+                    </a:p>
+                  </a:txBody>
+                  <a:tcPr marL="7803" marR="7803" marT="7803" marB="0" anchor="ctr"/>
+                </a:tc>
+                <a:tc>
+                  <a:txBody>
+                    <a:bodyPr/>
+                    <a:lstStyle/>
+                    <a:p>
+                      <a:pPr algn="ctr" fontAlgn="ctr"/>
+                      <a:r>
+                        <a:rPr lang="en-US" sz="900" u="none" strike="noStrike">
+                          <a:effectLst/>
+                        </a:rPr>
+                        <a:t>8/26/2019</a:t>
+                      </a:r>
+                      <a:endParaRPr lang="en-US" sz="900" b="1" i="0" u="none" strike="noStrike">
+                        <a:solidFill>
+                          <a:srgbClr val="000000"/>
+                        </a:solidFill>
+                        <a:effectLst/>
+                        <a:latin typeface="Calibri" panose="020F0502020204030204" pitchFamily="34" charset="0"/>
+                      </a:endParaRPr>
+                    </a:p>
+                  </a:txBody>
+                  <a:tcPr marL="7803" marR="7803" marT="7803" marB="0" anchor="ctr"/>
+                </a:tc>
+                <a:tc>
+                  <a:txBody>
+                    <a:bodyPr/>
+                    <a:lstStyle/>
+                    <a:p>
+                      <a:pPr algn="ctr" fontAlgn="ctr"/>
+                      <a:r>
+                        <a:rPr lang="en-US" sz="900" u="none" strike="noStrike">
+                          <a:effectLst/>
+                        </a:rPr>
+                        <a:t>10/6/2019</a:t>
+                      </a:r>
+                      <a:endParaRPr lang="en-US" sz="900" b="1" i="0" u="none" strike="noStrike">
+                        <a:solidFill>
+                          <a:srgbClr val="000000"/>
+                        </a:solidFill>
+                        <a:effectLst/>
+                        <a:latin typeface="Calibri" panose="020F0502020204030204" pitchFamily="34" charset="0"/>
+                      </a:endParaRPr>
+                    </a:p>
+                  </a:txBody>
+                  <a:tcPr marL="7803" marR="7803" marT="7803" marB="0" anchor="ctr"/>
+                </a:tc>
+                <a:tc>
+                  <a:txBody>
+                    <a:bodyPr/>
+                    <a:lstStyle/>
+                    <a:p>
+                      <a:pPr algn="ctr" fontAlgn="ctr"/>
+                      <a:r>
+                        <a:rPr lang="en-US" sz="900" u="none" strike="noStrike">
+                          <a:effectLst/>
+                        </a:rPr>
+                        <a:t>42</a:t>
+                      </a:r>
+                      <a:endParaRPr lang="en-US" sz="900" b="1" i="0" u="none" strike="noStrike">
+                        <a:solidFill>
+                          <a:srgbClr val="000000"/>
+                        </a:solidFill>
+                        <a:effectLst/>
+                        <a:latin typeface="Calibri" panose="020F0502020204030204" pitchFamily="34" charset="0"/>
+                      </a:endParaRPr>
+                    </a:p>
+                  </a:txBody>
+                  <a:tcPr marL="7803" marR="7803" marT="7803" marB="0" anchor="ctr"/>
+                </a:tc>
+                <a:extLst>
+                  <a:ext uri="{0D108BD9-81ED-4DB2-BD59-A6C34878D82A}">
+                    <a16:rowId xmlns:a16="http://schemas.microsoft.com/office/drawing/2014/main" val="2533831782"/>
+                  </a:ext>
+                </a:extLst>
+              </a:tr>
+              <a:tr h="143117">
+                <a:tc>
+                  <a:txBody>
+                    <a:bodyPr/>
+                    <a:lstStyle/>
+                    <a:p>
+                      <a:pPr algn="ctr" fontAlgn="ctr"/>
+                      <a:r>
+                        <a:rPr lang="en-US" sz="900" u="none" strike="noStrike">
+                          <a:effectLst/>
+                        </a:rPr>
+                        <a:t>2</a:t>
+                      </a:r>
+                      <a:endParaRPr lang="en-US" sz="900" b="1" i="0" u="none" strike="noStrike">
+                        <a:solidFill>
+                          <a:srgbClr val="000000"/>
+                        </a:solidFill>
+                        <a:effectLst/>
+                        <a:latin typeface="Calibri" panose="020F0502020204030204" pitchFamily="34" charset="0"/>
+                      </a:endParaRPr>
+                    </a:p>
+                  </a:txBody>
+                  <a:tcPr marL="7803" marR="7803" marT="7803" marB="0" anchor="ctr"/>
+                </a:tc>
+                <a:tc>
+                  <a:txBody>
+                    <a:bodyPr/>
+                    <a:lstStyle/>
+                    <a:p>
+                      <a:pPr algn="l" fontAlgn="ctr"/>
+                      <a:r>
+                        <a:rPr lang="en-US" sz="900" u="none" strike="noStrike">
+                          <a:effectLst/>
+                        </a:rPr>
+                        <a:t>Research &amp; Design</a:t>
+                      </a:r>
+                      <a:endParaRPr lang="en-US" sz="900" b="1" i="0" u="none" strike="noStrike">
+                        <a:solidFill>
+                          <a:srgbClr val="000000"/>
+                        </a:solidFill>
+                        <a:effectLst/>
+                        <a:latin typeface="Calibri" panose="020F0502020204030204" pitchFamily="34" charset="0"/>
+                      </a:endParaRPr>
+                    </a:p>
+                  </a:txBody>
+                  <a:tcPr marL="7803" marR="7803" marT="7803" marB="0" anchor="ctr"/>
+                </a:tc>
+                <a:tc>
+                  <a:txBody>
+                    <a:bodyPr/>
+                    <a:lstStyle/>
+                    <a:p>
+                      <a:pPr algn="l" fontAlgn="ctr"/>
+                      <a:r>
+                        <a:rPr lang="en-US" sz="900" u="none" strike="noStrike">
+                          <a:effectLst/>
+                        </a:rPr>
+                        <a:t>What do we need to know in order to build our prodcut.</a:t>
+                      </a:r>
+                      <a:endParaRPr lang="en-US" sz="900" b="0" i="0" u="none" strike="noStrike">
+                        <a:solidFill>
+                          <a:srgbClr val="000000"/>
+                        </a:solidFill>
+                        <a:effectLst/>
+                        <a:latin typeface="Calibri" panose="020F0502020204030204" pitchFamily="34" charset="0"/>
+                      </a:endParaRPr>
+                    </a:p>
+                  </a:txBody>
+                  <a:tcPr marL="7803" marR="7803" marT="7803" marB="0" anchor="ctr"/>
+                </a:tc>
+                <a:tc>
+                  <a:txBody>
+                    <a:bodyPr/>
+                    <a:lstStyle/>
+                    <a:p>
+                      <a:pPr algn="ctr" fontAlgn="ctr"/>
+                      <a:endParaRPr lang="en-US" sz="900" b="0" i="0" u="none" strike="noStrike">
+                        <a:solidFill>
+                          <a:srgbClr val="000000"/>
+                        </a:solidFill>
+                        <a:effectLst/>
+                        <a:latin typeface="Calibri" panose="020F0502020204030204" pitchFamily="34" charset="0"/>
+                      </a:endParaRPr>
+                    </a:p>
+                  </a:txBody>
+                  <a:tcPr marL="7803" marR="7803" marT="7803" marB="0" anchor="ctr"/>
+                </a:tc>
+                <a:tc>
+                  <a:txBody>
+                    <a:bodyPr/>
+                    <a:lstStyle/>
+                    <a:p>
+                      <a:pPr algn="ctr" fontAlgn="ctr"/>
+                      <a:r>
+                        <a:rPr lang="en-US" sz="900" u="none" strike="noStrike">
+                          <a:effectLst/>
+                        </a:rPr>
+                        <a:t>10/7/2019</a:t>
+                      </a:r>
+                      <a:endParaRPr lang="en-US" sz="900" b="1" i="0" u="none" strike="noStrike">
+                        <a:solidFill>
+                          <a:srgbClr val="000000"/>
+                        </a:solidFill>
+                        <a:effectLst/>
+                        <a:latin typeface="Calibri" panose="020F0502020204030204" pitchFamily="34" charset="0"/>
+                      </a:endParaRPr>
+                    </a:p>
+                  </a:txBody>
+                  <a:tcPr marL="7803" marR="7803" marT="7803" marB="0" anchor="ctr"/>
+                </a:tc>
+                <a:tc>
+                  <a:txBody>
+                    <a:bodyPr/>
+                    <a:lstStyle/>
+                    <a:p>
+                      <a:pPr algn="ctr" fontAlgn="ctr"/>
+                      <a:r>
+                        <a:rPr lang="en-US" sz="900" u="none" strike="noStrike">
+                          <a:effectLst/>
+                        </a:rPr>
+                        <a:t>10/27/2019</a:t>
+                      </a:r>
+                      <a:endParaRPr lang="en-US" sz="900" b="1" i="0" u="none" strike="noStrike">
+                        <a:solidFill>
+                          <a:srgbClr val="000000"/>
+                        </a:solidFill>
+                        <a:effectLst/>
+                        <a:latin typeface="Calibri" panose="020F0502020204030204" pitchFamily="34" charset="0"/>
+                      </a:endParaRPr>
+                    </a:p>
+                  </a:txBody>
+                  <a:tcPr marL="7803" marR="7803" marT="7803" marB="0" anchor="ctr"/>
+                </a:tc>
+                <a:tc>
+                  <a:txBody>
+                    <a:bodyPr/>
+                    <a:lstStyle/>
+                    <a:p>
+                      <a:pPr algn="ctr" fontAlgn="ctr"/>
+                      <a:r>
+                        <a:rPr lang="en-US" sz="900" u="none" strike="noStrike">
+                          <a:effectLst/>
+                        </a:rPr>
+                        <a:t>21</a:t>
+                      </a:r>
+                      <a:endParaRPr lang="en-US" sz="900" b="1" i="0" u="none" strike="noStrike">
+                        <a:solidFill>
+                          <a:srgbClr val="000000"/>
+                        </a:solidFill>
+                        <a:effectLst/>
+                        <a:latin typeface="Calibri" panose="020F0502020204030204" pitchFamily="34" charset="0"/>
+                      </a:endParaRPr>
+                    </a:p>
+                  </a:txBody>
+                  <a:tcPr marL="7803" marR="7803" marT="7803" marB="0" anchor="ctr"/>
+                </a:tc>
+                <a:extLst>
+                  <a:ext uri="{0D108BD9-81ED-4DB2-BD59-A6C34878D82A}">
+                    <a16:rowId xmlns:a16="http://schemas.microsoft.com/office/drawing/2014/main" val="186705209"/>
+                  </a:ext>
+                </a:extLst>
+              </a:tr>
+              <a:tr h="143117">
+                <a:tc>
+                  <a:txBody>
+                    <a:bodyPr/>
+                    <a:lstStyle/>
+                    <a:p>
+                      <a:pPr algn="ctr" fontAlgn="ctr"/>
+                      <a:r>
+                        <a:rPr lang="en-US" sz="900" u="none" strike="noStrike">
+                          <a:effectLst/>
+                        </a:rPr>
+                        <a:t>2.1</a:t>
+                      </a:r>
+                      <a:endParaRPr lang="en-US" sz="900" b="0" i="0" u="none" strike="noStrike">
+                        <a:solidFill>
+                          <a:srgbClr val="000000"/>
+                        </a:solidFill>
+                        <a:effectLst/>
+                        <a:latin typeface="Calibri" panose="020F0502020204030204" pitchFamily="34" charset="0"/>
+                      </a:endParaRPr>
+                    </a:p>
+                  </a:txBody>
+                  <a:tcPr marL="7803" marR="7803" marT="7803" marB="0" anchor="ctr"/>
+                </a:tc>
+                <a:tc>
+                  <a:txBody>
+                    <a:bodyPr/>
+                    <a:lstStyle/>
+                    <a:p>
+                      <a:pPr algn="l" fontAlgn="ctr"/>
+                      <a:r>
+                        <a:rPr lang="en-US" sz="900" u="none" strike="noStrike">
+                          <a:effectLst/>
+                        </a:rPr>
+                        <a:t>Existing Tools</a:t>
+                      </a:r>
+                      <a:endParaRPr lang="en-US" sz="900" b="0" i="0" u="none" strike="noStrike">
+                        <a:solidFill>
+                          <a:srgbClr val="000000"/>
+                        </a:solidFill>
+                        <a:effectLst/>
+                        <a:latin typeface="Calibri" panose="020F0502020204030204" pitchFamily="34" charset="0"/>
+                      </a:endParaRPr>
+                    </a:p>
+                  </a:txBody>
+                  <a:tcPr marL="7803" marR="7803" marT="7803" marB="0" anchor="ctr"/>
+                </a:tc>
+                <a:tc>
+                  <a:txBody>
+                    <a:bodyPr/>
+                    <a:lstStyle/>
+                    <a:p>
+                      <a:pPr algn="l" fontAlgn="ctr"/>
+                      <a:r>
+                        <a:rPr lang="en-US" sz="900" u="none" strike="noStrike" dirty="0">
+                          <a:effectLst/>
+                        </a:rPr>
+                        <a:t>What tools </a:t>
+                      </a:r>
+                      <a:r>
+                        <a:rPr lang="en-US" sz="900" u="none" strike="noStrike" dirty="0" err="1">
+                          <a:effectLst/>
+                        </a:rPr>
+                        <a:t>arleady</a:t>
+                      </a:r>
+                      <a:r>
+                        <a:rPr lang="en-US" sz="900" u="none" strike="noStrike" dirty="0">
+                          <a:effectLst/>
+                        </a:rPr>
+                        <a:t> exist, how do they work, and where do they fall short?</a:t>
+                      </a:r>
+                      <a:endParaRPr lang="en-US" sz="900" b="0" i="0" u="none" strike="noStrike" dirty="0">
+                        <a:solidFill>
+                          <a:srgbClr val="000000"/>
+                        </a:solidFill>
+                        <a:effectLst/>
+                        <a:latin typeface="Calibri" panose="020F0502020204030204" pitchFamily="34" charset="0"/>
+                      </a:endParaRPr>
+                    </a:p>
+                  </a:txBody>
+                  <a:tcPr marL="7803" marR="7803" marT="7803" marB="0" anchor="ctr"/>
+                </a:tc>
+                <a:tc>
+                  <a:txBody>
+                    <a:bodyPr/>
+                    <a:lstStyle/>
+                    <a:p>
+                      <a:pPr algn="ctr" fontAlgn="ctr"/>
+                      <a:r>
+                        <a:rPr lang="en-US" sz="900" u="none" strike="noStrike">
+                          <a:effectLst/>
+                        </a:rPr>
+                        <a:t>T03</a:t>
+                      </a:r>
+                      <a:endParaRPr lang="en-US" sz="900" b="0" i="0" u="none" strike="noStrike">
+                        <a:solidFill>
+                          <a:srgbClr val="000000"/>
+                        </a:solidFill>
+                        <a:effectLst/>
+                        <a:latin typeface="Calibri" panose="020F0502020204030204" pitchFamily="34" charset="0"/>
+                      </a:endParaRPr>
+                    </a:p>
+                  </a:txBody>
+                  <a:tcPr marL="7803" marR="7803" marT="7803" marB="0" anchor="ctr"/>
+                </a:tc>
+                <a:tc>
+                  <a:txBody>
+                    <a:bodyPr/>
+                    <a:lstStyle/>
+                    <a:p>
+                      <a:pPr algn="ctr" fontAlgn="ctr"/>
+                      <a:r>
+                        <a:rPr lang="en-US" sz="900" u="none" strike="noStrike">
+                          <a:effectLst/>
+                        </a:rPr>
+                        <a:t>10/7/2019</a:t>
+                      </a:r>
+                      <a:endParaRPr lang="en-US" sz="900" b="0" i="0" u="none" strike="noStrike">
+                        <a:solidFill>
+                          <a:srgbClr val="000000"/>
+                        </a:solidFill>
+                        <a:effectLst/>
+                        <a:latin typeface="Calibri" panose="020F0502020204030204" pitchFamily="34" charset="0"/>
+                      </a:endParaRPr>
+                    </a:p>
+                  </a:txBody>
+                  <a:tcPr marL="7803" marR="7803" marT="7803" marB="0" anchor="ctr"/>
+                </a:tc>
+                <a:tc>
+                  <a:txBody>
+                    <a:bodyPr/>
+                    <a:lstStyle/>
+                    <a:p>
+                      <a:pPr algn="ctr" fontAlgn="ctr"/>
+                      <a:r>
+                        <a:rPr lang="en-US" sz="900" u="none" strike="noStrike">
+                          <a:effectLst/>
+                        </a:rPr>
+                        <a:t>10/13/2019</a:t>
+                      </a:r>
+                      <a:endParaRPr lang="en-US" sz="900" b="0" i="0" u="none" strike="noStrike">
+                        <a:solidFill>
+                          <a:srgbClr val="000000"/>
+                        </a:solidFill>
+                        <a:effectLst/>
+                        <a:latin typeface="Calibri" panose="020F0502020204030204" pitchFamily="34" charset="0"/>
+                      </a:endParaRPr>
+                    </a:p>
+                  </a:txBody>
+                  <a:tcPr marL="7803" marR="7803" marT="7803" marB="0" anchor="ctr"/>
+                </a:tc>
+                <a:tc>
+                  <a:txBody>
+                    <a:bodyPr/>
+                    <a:lstStyle/>
+                    <a:p>
+                      <a:pPr algn="ctr" fontAlgn="ctr"/>
+                      <a:r>
+                        <a:rPr lang="en-US" sz="900" u="none" strike="noStrike">
+                          <a:effectLst/>
+                        </a:rPr>
+                        <a:t>7</a:t>
+                      </a:r>
+                      <a:endParaRPr lang="en-US" sz="900" b="0" i="0" u="none" strike="noStrike">
+                        <a:solidFill>
+                          <a:srgbClr val="000000"/>
+                        </a:solidFill>
+                        <a:effectLst/>
+                        <a:latin typeface="Calibri" panose="020F0502020204030204" pitchFamily="34" charset="0"/>
+                      </a:endParaRPr>
+                    </a:p>
+                  </a:txBody>
+                  <a:tcPr marL="7803" marR="7803" marT="7803" marB="0" anchor="ctr"/>
+                </a:tc>
+                <a:extLst>
+                  <a:ext uri="{0D108BD9-81ED-4DB2-BD59-A6C34878D82A}">
+                    <a16:rowId xmlns:a16="http://schemas.microsoft.com/office/drawing/2014/main" val="3008495902"/>
+                  </a:ext>
+                </a:extLst>
+              </a:tr>
+              <a:tr h="143117">
+                <a:tc>
+                  <a:txBody>
+                    <a:bodyPr/>
+                    <a:lstStyle/>
+                    <a:p>
+                      <a:pPr algn="ctr" fontAlgn="ctr"/>
+                      <a:r>
+                        <a:rPr lang="en-US" sz="900" u="none" strike="noStrike">
+                          <a:effectLst/>
+                        </a:rPr>
+                        <a:t>2.2</a:t>
+                      </a:r>
+                      <a:endParaRPr lang="en-US" sz="900" b="0" i="0" u="none" strike="noStrike">
+                        <a:solidFill>
+                          <a:srgbClr val="000000"/>
+                        </a:solidFill>
+                        <a:effectLst/>
+                        <a:latin typeface="Calibri" panose="020F0502020204030204" pitchFamily="34" charset="0"/>
+                      </a:endParaRPr>
+                    </a:p>
+                  </a:txBody>
+                  <a:tcPr marL="7803" marR="7803" marT="7803" marB="0" anchor="ctr"/>
+                </a:tc>
+                <a:tc>
+                  <a:txBody>
+                    <a:bodyPr/>
+                    <a:lstStyle/>
+                    <a:p>
+                      <a:pPr algn="l" fontAlgn="ctr"/>
+                      <a:r>
+                        <a:rPr lang="en-US" sz="900" u="none" strike="noStrike">
+                          <a:effectLst/>
+                        </a:rPr>
+                        <a:t>General Architecture</a:t>
+                      </a:r>
+                      <a:endParaRPr lang="en-US" sz="900" b="0" i="0" u="none" strike="noStrike">
+                        <a:solidFill>
+                          <a:srgbClr val="000000"/>
+                        </a:solidFill>
+                        <a:effectLst/>
+                        <a:latin typeface="Calibri" panose="020F0502020204030204" pitchFamily="34" charset="0"/>
+                      </a:endParaRPr>
+                    </a:p>
+                  </a:txBody>
+                  <a:tcPr marL="7803" marR="7803" marT="7803" marB="0" anchor="ctr"/>
+                </a:tc>
+                <a:tc>
+                  <a:txBody>
+                    <a:bodyPr/>
+                    <a:lstStyle/>
+                    <a:p>
+                      <a:pPr algn="l" fontAlgn="ctr"/>
+                      <a:r>
+                        <a:rPr lang="en-US" sz="900" u="none" strike="noStrike">
+                          <a:effectLst/>
+                        </a:rPr>
+                        <a:t>Refine required software, structures, and tools for Dev.</a:t>
+                      </a:r>
+                      <a:endParaRPr lang="en-US" sz="900" b="0" i="0" u="none" strike="noStrike">
+                        <a:solidFill>
+                          <a:srgbClr val="000000"/>
+                        </a:solidFill>
+                        <a:effectLst/>
+                        <a:latin typeface="Calibri" panose="020F0502020204030204" pitchFamily="34" charset="0"/>
+                      </a:endParaRPr>
+                    </a:p>
+                  </a:txBody>
+                  <a:tcPr marL="7803" marR="7803" marT="7803" marB="0" anchor="ctr"/>
+                </a:tc>
+                <a:tc>
+                  <a:txBody>
+                    <a:bodyPr/>
+                    <a:lstStyle/>
+                    <a:p>
+                      <a:pPr algn="ctr" fontAlgn="ctr"/>
+                      <a:r>
+                        <a:rPr lang="en-US" sz="900" u="none" strike="noStrike">
+                          <a:effectLst/>
+                        </a:rPr>
+                        <a:t>T04, E03</a:t>
+                      </a:r>
+                      <a:endParaRPr lang="en-US" sz="900" b="0" i="0" u="none" strike="noStrike">
+                        <a:solidFill>
+                          <a:srgbClr val="000000"/>
+                        </a:solidFill>
+                        <a:effectLst/>
+                        <a:latin typeface="Calibri" panose="020F0502020204030204" pitchFamily="34" charset="0"/>
+                      </a:endParaRPr>
+                    </a:p>
+                  </a:txBody>
+                  <a:tcPr marL="7803" marR="7803" marT="7803" marB="0" anchor="ctr"/>
+                </a:tc>
+                <a:tc>
+                  <a:txBody>
+                    <a:bodyPr/>
+                    <a:lstStyle/>
+                    <a:p>
+                      <a:pPr algn="ctr" fontAlgn="ctr"/>
+                      <a:r>
+                        <a:rPr lang="en-US" sz="900" u="none" strike="noStrike">
+                          <a:effectLst/>
+                        </a:rPr>
+                        <a:t>10/14/2019</a:t>
+                      </a:r>
+                      <a:endParaRPr lang="en-US" sz="900" b="0" i="0" u="none" strike="noStrike">
+                        <a:solidFill>
+                          <a:srgbClr val="000000"/>
+                        </a:solidFill>
+                        <a:effectLst/>
+                        <a:latin typeface="Calibri" panose="020F0502020204030204" pitchFamily="34" charset="0"/>
+                      </a:endParaRPr>
+                    </a:p>
+                  </a:txBody>
+                  <a:tcPr marL="7803" marR="7803" marT="7803" marB="0" anchor="ctr"/>
+                </a:tc>
+                <a:tc>
+                  <a:txBody>
+                    <a:bodyPr/>
+                    <a:lstStyle/>
+                    <a:p>
+                      <a:pPr algn="ctr" fontAlgn="ctr"/>
+                      <a:r>
+                        <a:rPr lang="en-US" sz="900" u="none" strike="noStrike">
+                          <a:effectLst/>
+                        </a:rPr>
+                        <a:t>10/20/2019</a:t>
+                      </a:r>
+                      <a:endParaRPr lang="en-US" sz="900" b="0" i="0" u="none" strike="noStrike">
+                        <a:solidFill>
+                          <a:srgbClr val="000000"/>
+                        </a:solidFill>
+                        <a:effectLst/>
+                        <a:latin typeface="Calibri" panose="020F0502020204030204" pitchFamily="34" charset="0"/>
+                      </a:endParaRPr>
+                    </a:p>
+                  </a:txBody>
+                  <a:tcPr marL="7803" marR="7803" marT="7803" marB="0" anchor="ctr"/>
+                </a:tc>
+                <a:tc>
+                  <a:txBody>
+                    <a:bodyPr/>
+                    <a:lstStyle/>
+                    <a:p>
+                      <a:pPr algn="ctr" fontAlgn="ctr"/>
+                      <a:r>
+                        <a:rPr lang="en-US" sz="900" u="none" strike="noStrike">
+                          <a:effectLst/>
+                        </a:rPr>
+                        <a:t>7</a:t>
+                      </a:r>
+                      <a:endParaRPr lang="en-US" sz="900" b="0" i="0" u="none" strike="noStrike">
+                        <a:solidFill>
+                          <a:srgbClr val="000000"/>
+                        </a:solidFill>
+                        <a:effectLst/>
+                        <a:latin typeface="Calibri" panose="020F0502020204030204" pitchFamily="34" charset="0"/>
+                      </a:endParaRPr>
+                    </a:p>
+                  </a:txBody>
+                  <a:tcPr marL="7803" marR="7803" marT="7803" marB="0" anchor="ctr"/>
+                </a:tc>
+                <a:extLst>
+                  <a:ext uri="{0D108BD9-81ED-4DB2-BD59-A6C34878D82A}">
+                    <a16:rowId xmlns:a16="http://schemas.microsoft.com/office/drawing/2014/main" val="4181320170"/>
+                  </a:ext>
+                </a:extLst>
+              </a:tr>
+              <a:tr h="143117">
+                <a:tc>
+                  <a:txBody>
+                    <a:bodyPr/>
+                    <a:lstStyle/>
+                    <a:p>
+                      <a:pPr algn="ctr" fontAlgn="ctr"/>
+                      <a:r>
+                        <a:rPr lang="en-US" sz="900" u="none" strike="noStrike">
+                          <a:effectLst/>
+                        </a:rPr>
+                        <a:t>2.3</a:t>
+                      </a:r>
+                      <a:endParaRPr lang="en-US" sz="900" b="0" i="0" u="none" strike="noStrike">
+                        <a:solidFill>
+                          <a:srgbClr val="000000"/>
+                        </a:solidFill>
+                        <a:effectLst/>
+                        <a:latin typeface="Calibri" panose="020F0502020204030204" pitchFamily="34" charset="0"/>
+                      </a:endParaRPr>
+                    </a:p>
+                  </a:txBody>
+                  <a:tcPr marL="7803" marR="7803" marT="7803" marB="0" anchor="ctr"/>
+                </a:tc>
+                <a:tc>
+                  <a:txBody>
+                    <a:bodyPr/>
+                    <a:lstStyle/>
+                    <a:p>
+                      <a:pPr algn="l" fontAlgn="ctr"/>
+                      <a:r>
+                        <a:rPr lang="en-US" sz="900" u="none" strike="noStrike">
+                          <a:effectLst/>
+                        </a:rPr>
+                        <a:t>Design</a:t>
+                      </a:r>
+                      <a:endParaRPr lang="en-US" sz="900" b="0" i="0" u="none" strike="noStrike">
+                        <a:solidFill>
+                          <a:srgbClr val="000000"/>
+                        </a:solidFill>
+                        <a:effectLst/>
+                        <a:latin typeface="Calibri" panose="020F0502020204030204" pitchFamily="34" charset="0"/>
+                      </a:endParaRPr>
+                    </a:p>
+                  </a:txBody>
+                  <a:tcPr marL="7803" marR="7803" marT="7803" marB="0" anchor="ctr"/>
+                </a:tc>
+                <a:tc>
+                  <a:txBody>
+                    <a:bodyPr/>
+                    <a:lstStyle/>
+                    <a:p>
+                      <a:pPr algn="l" fontAlgn="ctr"/>
+                      <a:r>
+                        <a:rPr lang="en-US" sz="900" u="none" strike="noStrike">
+                          <a:effectLst/>
+                        </a:rPr>
+                        <a:t>Define minimal viable product at each Dev. Stage.</a:t>
+                      </a:r>
+                      <a:endParaRPr lang="en-US" sz="900" b="0" i="0" u="none" strike="noStrike">
+                        <a:solidFill>
+                          <a:srgbClr val="000000"/>
+                        </a:solidFill>
+                        <a:effectLst/>
+                        <a:latin typeface="Calibri" panose="020F0502020204030204" pitchFamily="34" charset="0"/>
+                      </a:endParaRPr>
+                    </a:p>
+                  </a:txBody>
+                  <a:tcPr marL="7803" marR="7803" marT="7803" marB="0" anchor="ctr"/>
+                </a:tc>
+                <a:tc>
+                  <a:txBody>
+                    <a:bodyPr/>
+                    <a:lstStyle/>
+                    <a:p>
+                      <a:pPr algn="ctr" fontAlgn="ctr"/>
+                      <a:r>
+                        <a:rPr lang="en-US" sz="900" u="none" strike="noStrike">
+                          <a:effectLst/>
+                        </a:rPr>
+                        <a:t>T05</a:t>
+                      </a:r>
+                      <a:endParaRPr lang="en-US" sz="900" b="0" i="0" u="none" strike="noStrike">
+                        <a:solidFill>
+                          <a:srgbClr val="000000"/>
+                        </a:solidFill>
+                        <a:effectLst/>
+                        <a:latin typeface="Calibri" panose="020F0502020204030204" pitchFamily="34" charset="0"/>
+                      </a:endParaRPr>
+                    </a:p>
+                  </a:txBody>
+                  <a:tcPr marL="7803" marR="7803" marT="7803" marB="0" anchor="ctr"/>
+                </a:tc>
+                <a:tc>
+                  <a:txBody>
+                    <a:bodyPr/>
+                    <a:lstStyle/>
+                    <a:p>
+                      <a:pPr algn="ctr" fontAlgn="ctr"/>
+                      <a:r>
+                        <a:rPr lang="en-US" sz="900" u="none" strike="noStrike">
+                          <a:effectLst/>
+                        </a:rPr>
+                        <a:t>10/21/2019</a:t>
+                      </a:r>
+                      <a:endParaRPr lang="en-US" sz="900" b="0" i="0" u="none" strike="noStrike">
+                        <a:solidFill>
+                          <a:srgbClr val="000000"/>
+                        </a:solidFill>
+                        <a:effectLst/>
+                        <a:latin typeface="Calibri" panose="020F0502020204030204" pitchFamily="34" charset="0"/>
+                      </a:endParaRPr>
+                    </a:p>
+                  </a:txBody>
+                  <a:tcPr marL="7803" marR="7803" marT="7803" marB="0" anchor="ctr"/>
+                </a:tc>
+                <a:tc>
+                  <a:txBody>
+                    <a:bodyPr/>
+                    <a:lstStyle/>
+                    <a:p>
+                      <a:pPr algn="ctr" fontAlgn="ctr"/>
+                      <a:r>
+                        <a:rPr lang="en-US" sz="900" u="none" strike="noStrike">
+                          <a:effectLst/>
+                        </a:rPr>
+                        <a:t>10/27/2019</a:t>
+                      </a:r>
+                      <a:endParaRPr lang="en-US" sz="900" b="0" i="0" u="none" strike="noStrike">
+                        <a:solidFill>
+                          <a:srgbClr val="000000"/>
+                        </a:solidFill>
+                        <a:effectLst/>
+                        <a:latin typeface="Calibri" panose="020F0502020204030204" pitchFamily="34" charset="0"/>
+                      </a:endParaRPr>
+                    </a:p>
+                  </a:txBody>
+                  <a:tcPr marL="7803" marR="7803" marT="7803" marB="0" anchor="ctr"/>
+                </a:tc>
+                <a:tc>
+                  <a:txBody>
+                    <a:bodyPr/>
+                    <a:lstStyle/>
+                    <a:p>
+                      <a:pPr algn="ctr" fontAlgn="ctr"/>
+                      <a:r>
+                        <a:rPr lang="en-US" sz="900" u="none" strike="noStrike">
+                          <a:effectLst/>
+                        </a:rPr>
+                        <a:t>7</a:t>
+                      </a:r>
+                      <a:endParaRPr lang="en-US" sz="900" b="0" i="0" u="none" strike="noStrike">
+                        <a:solidFill>
+                          <a:srgbClr val="000000"/>
+                        </a:solidFill>
+                        <a:effectLst/>
+                        <a:latin typeface="Calibri" panose="020F0502020204030204" pitchFamily="34" charset="0"/>
+                      </a:endParaRPr>
+                    </a:p>
+                  </a:txBody>
+                  <a:tcPr marL="7803" marR="7803" marT="7803" marB="0" anchor="ctr"/>
+                </a:tc>
+                <a:extLst>
+                  <a:ext uri="{0D108BD9-81ED-4DB2-BD59-A6C34878D82A}">
+                    <a16:rowId xmlns:a16="http://schemas.microsoft.com/office/drawing/2014/main" val="158715942"/>
+                  </a:ext>
+                </a:extLst>
+              </a:tr>
+              <a:tr h="143117">
+                <a:tc>
+                  <a:txBody>
+                    <a:bodyPr/>
+                    <a:lstStyle/>
+                    <a:p>
+                      <a:pPr algn="ctr" fontAlgn="ctr"/>
+                      <a:r>
+                        <a:rPr lang="en-US" sz="900" u="none" strike="noStrike">
+                          <a:effectLst/>
+                        </a:rPr>
+                        <a:t>3</a:t>
+                      </a:r>
+                      <a:endParaRPr lang="en-US" sz="900" b="1" i="0" u="none" strike="noStrike">
+                        <a:solidFill>
+                          <a:srgbClr val="000000"/>
+                        </a:solidFill>
+                        <a:effectLst/>
+                        <a:latin typeface="Calibri" panose="020F0502020204030204" pitchFamily="34" charset="0"/>
+                      </a:endParaRPr>
+                    </a:p>
+                  </a:txBody>
+                  <a:tcPr marL="7803" marR="7803" marT="7803" marB="0" anchor="ctr"/>
+                </a:tc>
+                <a:tc>
+                  <a:txBody>
+                    <a:bodyPr/>
+                    <a:lstStyle/>
+                    <a:p>
+                      <a:pPr algn="l" fontAlgn="ctr"/>
+                      <a:r>
+                        <a:rPr lang="en-US" sz="900" u="none" strike="noStrike">
+                          <a:effectLst/>
+                        </a:rPr>
+                        <a:t>Implementation / Coding</a:t>
+                      </a:r>
+                      <a:endParaRPr lang="en-US" sz="900" b="1" i="0" u="none" strike="noStrike">
+                        <a:solidFill>
+                          <a:srgbClr val="000000"/>
+                        </a:solidFill>
+                        <a:effectLst/>
+                        <a:latin typeface="Calibri" panose="020F0502020204030204" pitchFamily="34" charset="0"/>
+                      </a:endParaRPr>
+                    </a:p>
+                  </a:txBody>
+                  <a:tcPr marL="7803" marR="7803" marT="7803" marB="0" anchor="ctr"/>
+                </a:tc>
+                <a:tc>
+                  <a:txBody>
+                    <a:bodyPr/>
+                    <a:lstStyle/>
+                    <a:p>
+                      <a:pPr algn="l" fontAlgn="ctr"/>
+                      <a:r>
+                        <a:rPr lang="en-US" sz="900" u="none" strike="noStrike">
+                          <a:effectLst/>
+                        </a:rPr>
+                        <a:t>Creating the product.</a:t>
+                      </a:r>
+                      <a:endParaRPr lang="en-US" sz="900" b="0" i="0" u="none" strike="noStrike">
+                        <a:solidFill>
+                          <a:srgbClr val="000000"/>
+                        </a:solidFill>
+                        <a:effectLst/>
+                        <a:latin typeface="Calibri" panose="020F0502020204030204" pitchFamily="34" charset="0"/>
+                      </a:endParaRPr>
+                    </a:p>
+                  </a:txBody>
+                  <a:tcPr marL="7803" marR="7803" marT="7803" marB="0" anchor="ctr"/>
+                </a:tc>
+                <a:tc>
+                  <a:txBody>
+                    <a:bodyPr/>
+                    <a:lstStyle/>
+                    <a:p>
+                      <a:pPr algn="ctr" fontAlgn="ctr"/>
+                      <a:endParaRPr lang="en-US" sz="900" b="0" i="0" u="none" strike="noStrike">
+                        <a:solidFill>
+                          <a:srgbClr val="000000"/>
+                        </a:solidFill>
+                        <a:effectLst/>
+                        <a:latin typeface="Calibri" panose="020F0502020204030204" pitchFamily="34" charset="0"/>
+                      </a:endParaRPr>
+                    </a:p>
+                  </a:txBody>
+                  <a:tcPr marL="7803" marR="7803" marT="7803" marB="0" anchor="ctr"/>
+                </a:tc>
+                <a:tc>
+                  <a:txBody>
+                    <a:bodyPr/>
+                    <a:lstStyle/>
+                    <a:p>
+                      <a:pPr algn="ctr" fontAlgn="ctr"/>
+                      <a:r>
+                        <a:rPr lang="en-US" sz="900" u="none" strike="noStrike">
+                          <a:effectLst/>
+                        </a:rPr>
+                        <a:t>10/28/2019</a:t>
+                      </a:r>
+                      <a:endParaRPr lang="en-US" sz="900" b="1" i="0" u="none" strike="noStrike">
+                        <a:solidFill>
+                          <a:srgbClr val="000000"/>
+                        </a:solidFill>
+                        <a:effectLst/>
+                        <a:latin typeface="Calibri" panose="020F0502020204030204" pitchFamily="34" charset="0"/>
+                      </a:endParaRPr>
+                    </a:p>
+                  </a:txBody>
+                  <a:tcPr marL="7803" marR="7803" marT="7803" marB="0" anchor="ctr"/>
+                </a:tc>
+                <a:tc>
+                  <a:txBody>
+                    <a:bodyPr/>
+                    <a:lstStyle/>
+                    <a:p>
+                      <a:pPr algn="ctr" fontAlgn="ctr"/>
+                      <a:r>
+                        <a:rPr lang="en-US" sz="900" u="none" strike="noStrike">
+                          <a:effectLst/>
+                        </a:rPr>
+                        <a:t>2/17/2019</a:t>
+                      </a:r>
+                      <a:endParaRPr lang="en-US" sz="900" b="1" i="0" u="none" strike="noStrike">
+                        <a:solidFill>
+                          <a:srgbClr val="000000"/>
+                        </a:solidFill>
+                        <a:effectLst/>
+                        <a:latin typeface="Calibri" panose="020F0502020204030204" pitchFamily="34" charset="0"/>
+                      </a:endParaRPr>
+                    </a:p>
+                  </a:txBody>
+                  <a:tcPr marL="7803" marR="7803" marT="7803" marB="0" anchor="ctr"/>
+                </a:tc>
+                <a:tc>
+                  <a:txBody>
+                    <a:bodyPr/>
+                    <a:lstStyle/>
+                    <a:p>
+                      <a:pPr algn="ctr" fontAlgn="ctr"/>
+                      <a:r>
+                        <a:rPr lang="en-US" sz="900" u="none" strike="noStrike">
+                          <a:effectLst/>
+                        </a:rPr>
+                        <a:t>70</a:t>
+                      </a:r>
+                      <a:endParaRPr lang="en-US" sz="900" b="1" i="0" u="none" strike="noStrike">
+                        <a:solidFill>
+                          <a:srgbClr val="000000"/>
+                        </a:solidFill>
+                        <a:effectLst/>
+                        <a:latin typeface="Calibri" panose="020F0502020204030204" pitchFamily="34" charset="0"/>
+                      </a:endParaRPr>
+                    </a:p>
+                  </a:txBody>
+                  <a:tcPr marL="7803" marR="7803" marT="7803" marB="0" anchor="ctr"/>
+                </a:tc>
+                <a:extLst>
+                  <a:ext uri="{0D108BD9-81ED-4DB2-BD59-A6C34878D82A}">
+                    <a16:rowId xmlns:a16="http://schemas.microsoft.com/office/drawing/2014/main" val="1933096895"/>
+                  </a:ext>
+                </a:extLst>
+              </a:tr>
+              <a:tr h="143117">
+                <a:tc>
+                  <a:txBody>
+                    <a:bodyPr/>
+                    <a:lstStyle/>
+                    <a:p>
+                      <a:pPr algn="ctr" fontAlgn="ctr"/>
+                      <a:r>
+                        <a:rPr lang="en-US" sz="900" u="none" strike="noStrike">
+                          <a:effectLst/>
+                        </a:rPr>
+                        <a:t>3.1</a:t>
+                      </a:r>
+                      <a:endParaRPr lang="en-US" sz="900" b="0" i="0" u="none" strike="noStrike">
+                        <a:solidFill>
+                          <a:srgbClr val="000000"/>
+                        </a:solidFill>
+                        <a:effectLst/>
+                        <a:latin typeface="Calibri" panose="020F0502020204030204" pitchFamily="34" charset="0"/>
+                      </a:endParaRPr>
+                    </a:p>
+                  </a:txBody>
+                  <a:tcPr marL="7803" marR="7803" marT="7803" marB="0" anchor="ctr"/>
+                </a:tc>
+                <a:tc>
+                  <a:txBody>
+                    <a:bodyPr/>
+                    <a:lstStyle/>
+                    <a:p>
+                      <a:pPr algn="l" fontAlgn="ctr"/>
+                      <a:r>
+                        <a:rPr lang="en-US" sz="900" u="none" strike="noStrike">
+                          <a:effectLst/>
+                        </a:rPr>
+                        <a:t>Packer Dev.</a:t>
+                      </a:r>
+                      <a:endParaRPr lang="en-US" sz="900" b="0" i="0" u="none" strike="noStrike">
+                        <a:solidFill>
+                          <a:srgbClr val="000000"/>
+                        </a:solidFill>
+                        <a:effectLst/>
+                        <a:latin typeface="Calibri" panose="020F0502020204030204" pitchFamily="34" charset="0"/>
+                      </a:endParaRPr>
+                    </a:p>
+                  </a:txBody>
+                  <a:tcPr marL="7803" marR="7803" marT="7803" marB="0" anchor="ctr"/>
+                </a:tc>
+                <a:tc>
+                  <a:txBody>
+                    <a:bodyPr/>
+                    <a:lstStyle/>
+                    <a:p>
+                      <a:pPr algn="l" fontAlgn="ctr"/>
+                      <a:r>
+                        <a:rPr lang="en-US" sz="900" u="none" strike="noStrike">
+                          <a:effectLst/>
+                        </a:rPr>
+                        <a:t>Build packer.</a:t>
+                      </a:r>
+                      <a:endParaRPr lang="en-US" sz="900" b="0" i="0" u="none" strike="noStrike">
+                        <a:solidFill>
+                          <a:srgbClr val="000000"/>
+                        </a:solidFill>
+                        <a:effectLst/>
+                        <a:latin typeface="Calibri" panose="020F0502020204030204" pitchFamily="34" charset="0"/>
+                      </a:endParaRPr>
+                    </a:p>
+                  </a:txBody>
+                  <a:tcPr marL="7803" marR="7803" marT="7803" marB="0" anchor="ctr"/>
+                </a:tc>
+                <a:tc>
+                  <a:txBody>
+                    <a:bodyPr/>
+                    <a:lstStyle/>
+                    <a:p>
+                      <a:pPr algn="ctr" fontAlgn="ctr"/>
+                      <a:r>
+                        <a:rPr lang="en-US" sz="900" u="none" strike="noStrike">
+                          <a:effectLst/>
+                        </a:rPr>
+                        <a:t>T06, T07, T11</a:t>
+                      </a:r>
+                      <a:endParaRPr lang="en-US" sz="900" b="0" i="0" u="none" strike="noStrike">
+                        <a:solidFill>
+                          <a:srgbClr val="000000"/>
+                        </a:solidFill>
+                        <a:effectLst/>
+                        <a:latin typeface="Calibri" panose="020F0502020204030204" pitchFamily="34" charset="0"/>
+                      </a:endParaRPr>
+                    </a:p>
+                  </a:txBody>
+                  <a:tcPr marL="7803" marR="7803" marT="7803" marB="0" anchor="ctr"/>
+                </a:tc>
+                <a:tc>
+                  <a:txBody>
+                    <a:bodyPr/>
+                    <a:lstStyle/>
+                    <a:p>
+                      <a:pPr algn="ctr" fontAlgn="ctr"/>
+                      <a:r>
+                        <a:rPr lang="en-US" sz="900" u="none" strike="noStrike">
+                          <a:effectLst/>
+                        </a:rPr>
+                        <a:t>10/28/2019</a:t>
+                      </a:r>
+                      <a:endParaRPr lang="en-US" sz="900" b="0" i="0" u="none" strike="noStrike">
+                        <a:solidFill>
+                          <a:srgbClr val="000000"/>
+                        </a:solidFill>
+                        <a:effectLst/>
+                        <a:latin typeface="Calibri" panose="020F0502020204030204" pitchFamily="34" charset="0"/>
+                      </a:endParaRPr>
+                    </a:p>
+                  </a:txBody>
+                  <a:tcPr marL="7803" marR="7803" marT="7803" marB="0" anchor="ctr"/>
+                </a:tc>
+                <a:tc>
+                  <a:txBody>
+                    <a:bodyPr/>
+                    <a:lstStyle/>
+                    <a:p>
+                      <a:pPr algn="ctr" fontAlgn="ctr"/>
+                      <a:r>
+                        <a:rPr lang="en-US" sz="900" u="none" strike="noStrike">
+                          <a:effectLst/>
+                        </a:rPr>
+                        <a:t>11/10/2019</a:t>
+                      </a:r>
+                      <a:endParaRPr lang="en-US" sz="900" b="0" i="0" u="none" strike="noStrike">
+                        <a:solidFill>
+                          <a:srgbClr val="000000"/>
+                        </a:solidFill>
+                        <a:effectLst/>
+                        <a:latin typeface="Calibri" panose="020F0502020204030204" pitchFamily="34" charset="0"/>
+                      </a:endParaRPr>
+                    </a:p>
+                  </a:txBody>
+                  <a:tcPr marL="7803" marR="7803" marT="7803" marB="0" anchor="ctr"/>
+                </a:tc>
+                <a:tc>
+                  <a:txBody>
+                    <a:bodyPr/>
+                    <a:lstStyle/>
+                    <a:p>
+                      <a:pPr algn="ctr" fontAlgn="ctr"/>
+                      <a:r>
+                        <a:rPr lang="en-US" sz="900" u="none" strike="noStrike">
+                          <a:effectLst/>
+                        </a:rPr>
+                        <a:t>14</a:t>
+                      </a:r>
+                      <a:endParaRPr lang="en-US" sz="900" b="0" i="0" u="none" strike="noStrike">
+                        <a:solidFill>
+                          <a:srgbClr val="000000"/>
+                        </a:solidFill>
+                        <a:effectLst/>
+                        <a:latin typeface="Calibri" panose="020F0502020204030204" pitchFamily="34" charset="0"/>
+                      </a:endParaRPr>
+                    </a:p>
+                  </a:txBody>
+                  <a:tcPr marL="7803" marR="7803" marT="7803" marB="0" anchor="ctr"/>
+                </a:tc>
+                <a:extLst>
+                  <a:ext uri="{0D108BD9-81ED-4DB2-BD59-A6C34878D82A}">
+                    <a16:rowId xmlns:a16="http://schemas.microsoft.com/office/drawing/2014/main" val="3770371218"/>
+                  </a:ext>
+                </a:extLst>
+              </a:tr>
+              <a:tr h="143117">
+                <a:tc>
+                  <a:txBody>
+                    <a:bodyPr/>
+                    <a:lstStyle/>
+                    <a:p>
+                      <a:pPr algn="ctr" fontAlgn="ctr"/>
+                      <a:r>
+                        <a:rPr lang="en-US" sz="900" u="none" strike="noStrike">
+                          <a:effectLst/>
+                        </a:rPr>
+                        <a:t>3.2</a:t>
+                      </a:r>
+                      <a:endParaRPr lang="en-US" sz="900" b="0" i="0" u="none" strike="noStrike">
+                        <a:solidFill>
+                          <a:srgbClr val="000000"/>
+                        </a:solidFill>
+                        <a:effectLst/>
+                        <a:latin typeface="Calibri" panose="020F0502020204030204" pitchFamily="34" charset="0"/>
+                      </a:endParaRPr>
+                    </a:p>
+                  </a:txBody>
+                  <a:tcPr marL="7803" marR="7803" marT="7803" marB="0" anchor="ctr"/>
+                </a:tc>
+                <a:tc>
+                  <a:txBody>
+                    <a:bodyPr/>
+                    <a:lstStyle/>
+                    <a:p>
+                      <a:pPr algn="l" fontAlgn="ctr"/>
+                      <a:r>
+                        <a:rPr lang="en-US" sz="900" u="none" strike="noStrike">
+                          <a:effectLst/>
+                        </a:rPr>
+                        <a:t>Loader Dev.</a:t>
+                      </a:r>
+                      <a:endParaRPr lang="en-US" sz="900" b="0" i="0" u="none" strike="noStrike">
+                        <a:solidFill>
+                          <a:srgbClr val="000000"/>
+                        </a:solidFill>
+                        <a:effectLst/>
+                        <a:latin typeface="Calibri" panose="020F0502020204030204" pitchFamily="34" charset="0"/>
+                      </a:endParaRPr>
+                    </a:p>
+                  </a:txBody>
+                  <a:tcPr marL="7803" marR="7803" marT="7803" marB="0" anchor="ctr"/>
+                </a:tc>
+                <a:tc>
+                  <a:txBody>
+                    <a:bodyPr/>
+                    <a:lstStyle/>
+                    <a:p>
+                      <a:pPr algn="l" fontAlgn="ctr"/>
+                      <a:r>
+                        <a:rPr lang="en-US" sz="900" u="none" strike="noStrike">
+                          <a:effectLst/>
+                        </a:rPr>
+                        <a:t>Build loader.</a:t>
+                      </a:r>
+                      <a:endParaRPr lang="en-US" sz="900" b="0" i="0" u="none" strike="noStrike">
+                        <a:solidFill>
+                          <a:srgbClr val="000000"/>
+                        </a:solidFill>
+                        <a:effectLst/>
+                        <a:latin typeface="Calibri" panose="020F0502020204030204" pitchFamily="34" charset="0"/>
+                      </a:endParaRPr>
+                    </a:p>
+                  </a:txBody>
+                  <a:tcPr marL="7803" marR="7803" marT="7803" marB="0" anchor="ctr"/>
+                </a:tc>
+                <a:tc>
+                  <a:txBody>
+                    <a:bodyPr/>
+                    <a:lstStyle/>
+                    <a:p>
+                      <a:pPr algn="ctr" fontAlgn="ctr"/>
+                      <a:r>
+                        <a:rPr lang="en-US" sz="900" u="none" strike="noStrike">
+                          <a:effectLst/>
+                        </a:rPr>
+                        <a:t>T08, T09, E04</a:t>
+                      </a:r>
+                      <a:endParaRPr lang="en-US" sz="900" b="0" i="0" u="none" strike="noStrike">
+                        <a:solidFill>
+                          <a:srgbClr val="000000"/>
+                        </a:solidFill>
+                        <a:effectLst/>
+                        <a:latin typeface="Calibri" panose="020F0502020204030204" pitchFamily="34" charset="0"/>
+                      </a:endParaRPr>
+                    </a:p>
+                  </a:txBody>
+                  <a:tcPr marL="7803" marR="7803" marT="7803" marB="0" anchor="ctr"/>
+                </a:tc>
+                <a:tc>
+                  <a:txBody>
+                    <a:bodyPr/>
+                    <a:lstStyle/>
+                    <a:p>
+                      <a:pPr algn="ctr" fontAlgn="ctr"/>
+                      <a:r>
+                        <a:rPr lang="en-US" sz="900" u="none" strike="noStrike">
+                          <a:effectLst/>
+                        </a:rPr>
+                        <a:t>11/11/2019</a:t>
+                      </a:r>
+                      <a:endParaRPr lang="en-US" sz="900" b="0" i="0" u="none" strike="noStrike">
+                        <a:solidFill>
+                          <a:srgbClr val="000000"/>
+                        </a:solidFill>
+                        <a:effectLst/>
+                        <a:latin typeface="Calibri" panose="020F0502020204030204" pitchFamily="34" charset="0"/>
+                      </a:endParaRPr>
+                    </a:p>
+                  </a:txBody>
+                  <a:tcPr marL="7803" marR="7803" marT="7803" marB="0" anchor="ctr"/>
+                </a:tc>
+                <a:tc>
+                  <a:txBody>
+                    <a:bodyPr/>
+                    <a:lstStyle/>
+                    <a:p>
+                      <a:pPr algn="ctr" fontAlgn="ctr"/>
+                      <a:r>
+                        <a:rPr lang="en-US" sz="900" u="none" strike="noStrike" dirty="0">
+                          <a:effectLst/>
+                        </a:rPr>
+                        <a:t>11/24/2019</a:t>
+                      </a:r>
+                      <a:endParaRPr lang="en-US" sz="900" b="0" i="0" u="none" strike="noStrike" dirty="0">
+                        <a:solidFill>
+                          <a:srgbClr val="000000"/>
+                        </a:solidFill>
+                        <a:effectLst/>
+                        <a:latin typeface="Calibri" panose="020F0502020204030204" pitchFamily="34" charset="0"/>
+                      </a:endParaRPr>
+                    </a:p>
+                  </a:txBody>
+                  <a:tcPr marL="7803" marR="7803" marT="7803" marB="0" anchor="ctr"/>
+                </a:tc>
+                <a:tc>
+                  <a:txBody>
+                    <a:bodyPr/>
+                    <a:lstStyle/>
+                    <a:p>
+                      <a:pPr algn="ctr" fontAlgn="ctr"/>
+                      <a:r>
+                        <a:rPr lang="en-US" sz="900" u="none" strike="noStrike">
+                          <a:effectLst/>
+                        </a:rPr>
+                        <a:t>14</a:t>
+                      </a:r>
+                      <a:endParaRPr lang="en-US" sz="900" b="0" i="0" u="none" strike="noStrike">
+                        <a:solidFill>
+                          <a:srgbClr val="000000"/>
+                        </a:solidFill>
+                        <a:effectLst/>
+                        <a:latin typeface="Calibri" panose="020F0502020204030204" pitchFamily="34" charset="0"/>
+                      </a:endParaRPr>
+                    </a:p>
+                  </a:txBody>
+                  <a:tcPr marL="7803" marR="7803" marT="7803" marB="0" anchor="ctr"/>
+                </a:tc>
+                <a:extLst>
+                  <a:ext uri="{0D108BD9-81ED-4DB2-BD59-A6C34878D82A}">
+                    <a16:rowId xmlns:a16="http://schemas.microsoft.com/office/drawing/2014/main" val="2650270193"/>
+                  </a:ext>
+                </a:extLst>
+              </a:tr>
+              <a:tr h="143117">
+                <a:tc>
+                  <a:txBody>
+                    <a:bodyPr/>
+                    <a:lstStyle/>
+                    <a:p>
+                      <a:pPr algn="ctr" fontAlgn="ctr"/>
+                      <a:r>
+                        <a:rPr lang="en-US" sz="900" u="none" strike="noStrike">
+                          <a:effectLst/>
+                        </a:rPr>
+                        <a:t>3.3</a:t>
+                      </a:r>
+                      <a:endParaRPr lang="en-US" sz="900" b="0" i="0" u="none" strike="noStrike">
+                        <a:solidFill>
+                          <a:srgbClr val="000000"/>
+                        </a:solidFill>
+                        <a:effectLst/>
+                        <a:latin typeface="Calibri" panose="020F0502020204030204" pitchFamily="34" charset="0"/>
+                      </a:endParaRPr>
+                    </a:p>
+                  </a:txBody>
+                  <a:tcPr marL="7803" marR="7803" marT="7803" marB="0" anchor="ctr"/>
+                </a:tc>
+                <a:tc>
+                  <a:txBody>
+                    <a:bodyPr/>
+                    <a:lstStyle/>
+                    <a:p>
+                      <a:pPr algn="l" fontAlgn="ctr"/>
+                      <a:r>
+                        <a:rPr lang="en-US" sz="900" u="none" strike="noStrike">
+                          <a:effectLst/>
+                        </a:rPr>
+                        <a:t>P/L Networking Dev.</a:t>
+                      </a:r>
+                      <a:endParaRPr lang="en-US" sz="900" b="0" i="0" u="none" strike="noStrike">
+                        <a:solidFill>
+                          <a:srgbClr val="000000"/>
+                        </a:solidFill>
+                        <a:effectLst/>
+                        <a:latin typeface="Calibri" panose="020F0502020204030204" pitchFamily="34" charset="0"/>
+                      </a:endParaRPr>
+                    </a:p>
+                  </a:txBody>
+                  <a:tcPr marL="7803" marR="7803" marT="7803" marB="0" anchor="ctr"/>
+                </a:tc>
+                <a:tc>
+                  <a:txBody>
+                    <a:bodyPr/>
+                    <a:lstStyle/>
+                    <a:p>
+                      <a:pPr algn="l" fontAlgn="ctr"/>
+                      <a:r>
+                        <a:rPr lang="en-US" sz="900" u="none" strike="noStrike">
+                          <a:effectLst/>
+                        </a:rPr>
+                        <a:t>Build networking for the packer to communicate with the loader.</a:t>
+                      </a:r>
+                      <a:endParaRPr lang="en-US" sz="900" b="0" i="0" u="none" strike="noStrike">
+                        <a:solidFill>
+                          <a:srgbClr val="000000"/>
+                        </a:solidFill>
+                        <a:effectLst/>
+                        <a:latin typeface="Calibri" panose="020F0502020204030204" pitchFamily="34" charset="0"/>
+                      </a:endParaRPr>
+                    </a:p>
+                  </a:txBody>
+                  <a:tcPr marL="7803" marR="7803" marT="7803" marB="0" anchor="ctr"/>
+                </a:tc>
+                <a:tc>
+                  <a:txBody>
+                    <a:bodyPr/>
+                    <a:lstStyle/>
+                    <a:p>
+                      <a:pPr algn="ctr" fontAlgn="ctr"/>
+                      <a:r>
+                        <a:rPr lang="en-US" sz="900" u="none" strike="noStrike">
+                          <a:effectLst/>
+                        </a:rPr>
+                        <a:t>T10, T12</a:t>
+                      </a:r>
+                      <a:endParaRPr lang="en-US" sz="900" b="0" i="0" u="none" strike="noStrike">
+                        <a:solidFill>
+                          <a:srgbClr val="000000"/>
+                        </a:solidFill>
+                        <a:effectLst/>
+                        <a:latin typeface="Calibri" panose="020F0502020204030204" pitchFamily="34" charset="0"/>
+                      </a:endParaRPr>
+                    </a:p>
+                  </a:txBody>
+                  <a:tcPr marL="7803" marR="7803" marT="7803" marB="0" anchor="ctr"/>
+                </a:tc>
+                <a:tc>
+                  <a:txBody>
+                    <a:bodyPr/>
+                    <a:lstStyle/>
+                    <a:p>
+                      <a:pPr algn="ctr" fontAlgn="ctr"/>
+                      <a:r>
+                        <a:rPr lang="en-US" sz="900" u="none" strike="noStrike" dirty="0">
+                          <a:effectLst/>
+                        </a:rPr>
+                        <a:t>11/25/2019</a:t>
+                      </a:r>
+                      <a:endParaRPr lang="en-US" sz="900" b="0" i="0" u="none" strike="noStrike" dirty="0">
+                        <a:solidFill>
+                          <a:srgbClr val="000000"/>
+                        </a:solidFill>
+                        <a:effectLst/>
+                        <a:latin typeface="Calibri" panose="020F0502020204030204" pitchFamily="34" charset="0"/>
+                      </a:endParaRPr>
+                    </a:p>
+                  </a:txBody>
+                  <a:tcPr marL="7803" marR="7803" marT="7803" marB="0" anchor="ctr"/>
+                </a:tc>
+                <a:tc>
+                  <a:txBody>
+                    <a:bodyPr/>
+                    <a:lstStyle/>
+                    <a:p>
+                      <a:pPr algn="ctr" fontAlgn="ctr"/>
+                      <a:r>
+                        <a:rPr lang="en-US" sz="900" u="none" strike="noStrike">
+                          <a:effectLst/>
+                        </a:rPr>
+                        <a:t>12/8/2019</a:t>
+                      </a:r>
+                      <a:endParaRPr lang="en-US" sz="900" b="0" i="0" u="none" strike="noStrike">
+                        <a:solidFill>
+                          <a:srgbClr val="000000"/>
+                        </a:solidFill>
+                        <a:effectLst/>
+                        <a:latin typeface="Calibri" panose="020F0502020204030204" pitchFamily="34" charset="0"/>
+                      </a:endParaRPr>
+                    </a:p>
+                  </a:txBody>
+                  <a:tcPr marL="7803" marR="7803" marT="7803" marB="0" anchor="ctr"/>
+                </a:tc>
+                <a:tc>
+                  <a:txBody>
+                    <a:bodyPr/>
+                    <a:lstStyle/>
+                    <a:p>
+                      <a:pPr algn="ctr" fontAlgn="ctr"/>
+                      <a:r>
+                        <a:rPr lang="en-US" sz="900" u="none" strike="noStrike">
+                          <a:effectLst/>
+                        </a:rPr>
+                        <a:t>14</a:t>
+                      </a:r>
+                      <a:endParaRPr lang="en-US" sz="900" b="0" i="0" u="none" strike="noStrike">
+                        <a:solidFill>
+                          <a:srgbClr val="000000"/>
+                        </a:solidFill>
+                        <a:effectLst/>
+                        <a:latin typeface="Calibri" panose="020F0502020204030204" pitchFamily="34" charset="0"/>
+                      </a:endParaRPr>
+                    </a:p>
+                  </a:txBody>
+                  <a:tcPr marL="7803" marR="7803" marT="7803" marB="0" anchor="ctr"/>
+                </a:tc>
+                <a:extLst>
+                  <a:ext uri="{0D108BD9-81ED-4DB2-BD59-A6C34878D82A}">
+                    <a16:rowId xmlns:a16="http://schemas.microsoft.com/office/drawing/2014/main" val="240123165"/>
+                  </a:ext>
+                </a:extLst>
+              </a:tr>
+              <a:tr h="143117">
+                <a:tc>
+                  <a:txBody>
+                    <a:bodyPr/>
+                    <a:lstStyle/>
+                    <a:p>
+                      <a:pPr algn="ctr" fontAlgn="ctr"/>
+                      <a:r>
+                        <a:rPr lang="en-US" sz="900" u="none" strike="noStrike">
+                          <a:effectLst/>
+                        </a:rPr>
+                        <a:t>3.4</a:t>
+                      </a:r>
+                      <a:endParaRPr lang="en-US" sz="900" b="0" i="0" u="none" strike="noStrike">
+                        <a:solidFill>
+                          <a:srgbClr val="000000"/>
+                        </a:solidFill>
+                        <a:effectLst/>
+                        <a:latin typeface="Calibri" panose="020F0502020204030204" pitchFamily="34" charset="0"/>
+                      </a:endParaRPr>
+                    </a:p>
+                  </a:txBody>
+                  <a:tcPr marL="7803" marR="7803" marT="7803" marB="0" anchor="ctr"/>
+                </a:tc>
+                <a:tc>
+                  <a:txBody>
+                    <a:bodyPr/>
+                    <a:lstStyle/>
+                    <a:p>
+                      <a:pPr algn="l" fontAlgn="ctr"/>
+                      <a:r>
+                        <a:rPr lang="en-US" sz="900" u="none" strike="noStrike">
+                          <a:effectLst/>
+                        </a:rPr>
+                        <a:t>P/L Networking Integration</a:t>
+                      </a:r>
+                      <a:endParaRPr lang="en-US" sz="900" b="0" i="0" u="none" strike="noStrike">
+                        <a:solidFill>
+                          <a:srgbClr val="000000"/>
+                        </a:solidFill>
+                        <a:effectLst/>
+                        <a:latin typeface="Calibri" panose="020F0502020204030204" pitchFamily="34" charset="0"/>
+                      </a:endParaRPr>
+                    </a:p>
+                  </a:txBody>
+                  <a:tcPr marL="7803" marR="7803" marT="7803" marB="0" anchor="ctr"/>
+                </a:tc>
+                <a:tc>
+                  <a:txBody>
+                    <a:bodyPr/>
+                    <a:lstStyle/>
+                    <a:p>
+                      <a:pPr algn="l" fontAlgn="ctr"/>
+                      <a:r>
+                        <a:rPr lang="en-US" sz="900" u="none" strike="noStrike">
+                          <a:effectLst/>
+                        </a:rPr>
+                        <a:t>Verification of previous development phases.</a:t>
+                      </a:r>
+                      <a:endParaRPr lang="en-US" sz="900" b="0" i="0" u="none" strike="noStrike">
+                        <a:solidFill>
+                          <a:srgbClr val="000000"/>
+                        </a:solidFill>
+                        <a:effectLst/>
+                        <a:latin typeface="Calibri" panose="020F0502020204030204" pitchFamily="34" charset="0"/>
+                      </a:endParaRPr>
+                    </a:p>
+                  </a:txBody>
+                  <a:tcPr marL="7803" marR="7803" marT="7803" marB="0" anchor="ctr"/>
+                </a:tc>
+                <a:tc rowSpan="8">
+                  <a:txBody>
+                    <a:bodyPr/>
+                    <a:lstStyle/>
+                    <a:p>
+                      <a:pPr algn="ctr" fontAlgn="ctr"/>
+                      <a:r>
+                        <a:rPr lang="en-US" sz="900" u="none" strike="noStrike" dirty="0">
+                          <a:effectLst/>
+                        </a:rPr>
+                        <a:t>TBD</a:t>
+                      </a:r>
+                      <a:endParaRPr lang="en-US" sz="900" b="0" i="0" u="none" strike="noStrike" dirty="0">
+                        <a:solidFill>
+                          <a:srgbClr val="000000"/>
+                        </a:solidFill>
+                        <a:effectLst/>
+                        <a:latin typeface="Calibri" panose="020F0502020204030204" pitchFamily="34" charset="0"/>
+                      </a:endParaRPr>
+                    </a:p>
+                  </a:txBody>
+                  <a:tcPr marL="7803" marR="7803" marT="7803" marB="0" anchor="ctr"/>
+                </a:tc>
+                <a:tc>
+                  <a:txBody>
+                    <a:bodyPr/>
+                    <a:lstStyle/>
+                    <a:p>
+                      <a:pPr algn="ctr" fontAlgn="ctr"/>
+                      <a:r>
+                        <a:rPr lang="en-US" sz="900" u="none" strike="noStrike">
+                          <a:effectLst/>
+                        </a:rPr>
+                        <a:t>1/20/2019</a:t>
+                      </a:r>
+                      <a:endParaRPr lang="en-US" sz="900" b="0" i="0" u="none" strike="noStrike">
+                        <a:solidFill>
+                          <a:srgbClr val="000000"/>
+                        </a:solidFill>
+                        <a:effectLst/>
+                        <a:latin typeface="Calibri" panose="020F0502020204030204" pitchFamily="34" charset="0"/>
+                      </a:endParaRPr>
+                    </a:p>
+                  </a:txBody>
+                  <a:tcPr marL="7803" marR="7803" marT="7803" marB="0" anchor="ctr"/>
+                </a:tc>
+                <a:tc>
+                  <a:txBody>
+                    <a:bodyPr/>
+                    <a:lstStyle/>
+                    <a:p>
+                      <a:pPr algn="ctr" fontAlgn="ctr"/>
+                      <a:r>
+                        <a:rPr lang="en-US" sz="900" u="none" strike="noStrike">
+                          <a:effectLst/>
+                        </a:rPr>
+                        <a:t>2/2/2019</a:t>
+                      </a:r>
+                      <a:endParaRPr lang="en-US" sz="900" b="0" i="0" u="none" strike="noStrike">
+                        <a:solidFill>
+                          <a:srgbClr val="000000"/>
+                        </a:solidFill>
+                        <a:effectLst/>
+                        <a:latin typeface="Calibri" panose="020F0502020204030204" pitchFamily="34" charset="0"/>
+                      </a:endParaRPr>
+                    </a:p>
+                  </a:txBody>
+                  <a:tcPr marL="7803" marR="7803" marT="7803" marB="0" anchor="ctr"/>
+                </a:tc>
+                <a:tc>
+                  <a:txBody>
+                    <a:bodyPr/>
+                    <a:lstStyle/>
+                    <a:p>
+                      <a:pPr algn="ctr" fontAlgn="ctr"/>
+                      <a:r>
+                        <a:rPr lang="en-US" sz="900" u="none" strike="noStrike">
+                          <a:effectLst/>
+                        </a:rPr>
+                        <a:t>14</a:t>
+                      </a:r>
+                      <a:endParaRPr lang="en-US" sz="900" b="0" i="0" u="none" strike="noStrike">
+                        <a:solidFill>
+                          <a:srgbClr val="000000"/>
+                        </a:solidFill>
+                        <a:effectLst/>
+                        <a:latin typeface="Calibri" panose="020F0502020204030204" pitchFamily="34" charset="0"/>
+                      </a:endParaRPr>
+                    </a:p>
+                  </a:txBody>
+                  <a:tcPr marL="7803" marR="7803" marT="7803" marB="0" anchor="ctr"/>
+                </a:tc>
+                <a:extLst>
+                  <a:ext uri="{0D108BD9-81ED-4DB2-BD59-A6C34878D82A}">
+                    <a16:rowId xmlns:a16="http://schemas.microsoft.com/office/drawing/2014/main" val="246430342"/>
+                  </a:ext>
+                </a:extLst>
+              </a:tr>
+              <a:tr h="143117">
+                <a:tc>
+                  <a:txBody>
+                    <a:bodyPr/>
+                    <a:lstStyle/>
+                    <a:p>
+                      <a:pPr algn="ctr" fontAlgn="ctr"/>
+                      <a:r>
+                        <a:rPr lang="en-US" sz="900" u="none" strike="noStrike">
+                          <a:effectLst/>
+                        </a:rPr>
+                        <a:t>3.5</a:t>
+                      </a:r>
+                      <a:endParaRPr lang="en-US" sz="900" b="0" i="0" u="none" strike="noStrike">
+                        <a:solidFill>
+                          <a:srgbClr val="000000"/>
+                        </a:solidFill>
+                        <a:effectLst/>
+                        <a:latin typeface="Calibri" panose="020F0502020204030204" pitchFamily="34" charset="0"/>
+                      </a:endParaRPr>
+                    </a:p>
+                  </a:txBody>
+                  <a:tcPr marL="7803" marR="7803" marT="7803" marB="0" anchor="ctr"/>
+                </a:tc>
+                <a:tc>
+                  <a:txBody>
+                    <a:bodyPr/>
+                    <a:lstStyle/>
+                    <a:p>
+                      <a:pPr algn="l" fontAlgn="ctr"/>
+                      <a:r>
+                        <a:rPr lang="en-US" sz="900" u="none" strike="noStrike">
+                          <a:effectLst/>
+                        </a:rPr>
+                        <a:t>Deployment Mechanism Dev.</a:t>
+                      </a:r>
+                      <a:endParaRPr lang="en-US" sz="900" b="0" i="0" u="none" strike="noStrike">
+                        <a:solidFill>
+                          <a:srgbClr val="000000"/>
+                        </a:solidFill>
+                        <a:effectLst/>
+                        <a:latin typeface="Calibri" panose="020F0502020204030204" pitchFamily="34" charset="0"/>
+                      </a:endParaRPr>
+                    </a:p>
+                  </a:txBody>
+                  <a:tcPr marL="7803" marR="7803" marT="7803" marB="0" anchor="ctr"/>
+                </a:tc>
+                <a:tc>
+                  <a:txBody>
+                    <a:bodyPr/>
+                    <a:lstStyle/>
+                    <a:p>
+                      <a:pPr algn="l" fontAlgn="ctr"/>
+                      <a:r>
+                        <a:rPr lang="en-US" sz="900" u="none" strike="noStrike">
+                          <a:effectLst/>
+                        </a:rPr>
+                        <a:t>Build basic modules for deploying the packer/loader.</a:t>
+                      </a:r>
+                      <a:endParaRPr lang="en-US" sz="900" b="0" i="0" u="none" strike="noStrike">
+                        <a:solidFill>
+                          <a:srgbClr val="000000"/>
+                        </a:solidFill>
+                        <a:effectLst/>
+                        <a:latin typeface="Calibri" panose="020F0502020204030204" pitchFamily="34" charset="0"/>
+                      </a:endParaRPr>
+                    </a:p>
+                  </a:txBody>
+                  <a:tcPr marL="7803" marR="7803" marT="7803" marB="0" anchor="ctr"/>
+                </a:tc>
+                <a:tc vMerge="1">
+                  <a:txBody>
+                    <a:bodyPr/>
+                    <a:lstStyle/>
+                    <a:p>
+                      <a:endParaRPr lang="en-US"/>
+                    </a:p>
+                  </a:txBody>
+                  <a:tcPr/>
+                </a:tc>
+                <a:tc>
+                  <a:txBody>
+                    <a:bodyPr/>
+                    <a:lstStyle/>
+                    <a:p>
+                      <a:pPr algn="ctr" fontAlgn="ctr"/>
+                      <a:r>
+                        <a:rPr lang="en-US" sz="900" u="none" strike="noStrike">
+                          <a:effectLst/>
+                        </a:rPr>
+                        <a:t>2/3/2019</a:t>
+                      </a:r>
+                      <a:endParaRPr lang="en-US" sz="900" b="0" i="0" u="none" strike="noStrike">
+                        <a:solidFill>
+                          <a:srgbClr val="000000"/>
+                        </a:solidFill>
+                        <a:effectLst/>
+                        <a:latin typeface="Calibri" panose="020F0502020204030204" pitchFamily="34" charset="0"/>
+                      </a:endParaRPr>
+                    </a:p>
+                  </a:txBody>
+                  <a:tcPr marL="7803" marR="7803" marT="7803" marB="0" anchor="ctr"/>
+                </a:tc>
+                <a:tc>
+                  <a:txBody>
+                    <a:bodyPr/>
+                    <a:lstStyle/>
+                    <a:p>
+                      <a:pPr algn="ctr" fontAlgn="ctr"/>
+                      <a:r>
+                        <a:rPr lang="en-US" sz="900" u="none" strike="noStrike">
+                          <a:effectLst/>
+                        </a:rPr>
+                        <a:t>2/16/2019</a:t>
+                      </a:r>
+                      <a:endParaRPr lang="en-US" sz="900" b="0" i="0" u="none" strike="noStrike">
+                        <a:solidFill>
+                          <a:srgbClr val="000000"/>
+                        </a:solidFill>
+                        <a:effectLst/>
+                        <a:latin typeface="Calibri" panose="020F0502020204030204" pitchFamily="34" charset="0"/>
+                      </a:endParaRPr>
+                    </a:p>
+                  </a:txBody>
+                  <a:tcPr marL="7803" marR="7803" marT="7803" marB="0" anchor="ctr"/>
+                </a:tc>
+                <a:tc>
+                  <a:txBody>
+                    <a:bodyPr/>
+                    <a:lstStyle/>
+                    <a:p>
+                      <a:pPr algn="ctr" fontAlgn="ctr"/>
+                      <a:r>
+                        <a:rPr lang="en-US" sz="900" u="none" strike="noStrike">
+                          <a:effectLst/>
+                        </a:rPr>
+                        <a:t>14</a:t>
+                      </a:r>
+                      <a:endParaRPr lang="en-US" sz="900" b="0" i="0" u="none" strike="noStrike">
+                        <a:solidFill>
+                          <a:srgbClr val="000000"/>
+                        </a:solidFill>
+                        <a:effectLst/>
+                        <a:latin typeface="Calibri" panose="020F0502020204030204" pitchFamily="34" charset="0"/>
+                      </a:endParaRPr>
+                    </a:p>
+                  </a:txBody>
+                  <a:tcPr marL="7803" marR="7803" marT="7803" marB="0" anchor="ctr"/>
+                </a:tc>
+                <a:extLst>
+                  <a:ext uri="{0D108BD9-81ED-4DB2-BD59-A6C34878D82A}">
+                    <a16:rowId xmlns:a16="http://schemas.microsoft.com/office/drawing/2014/main" val="2037664047"/>
+                  </a:ext>
+                </a:extLst>
+              </a:tr>
+              <a:tr h="143117">
+                <a:tc>
+                  <a:txBody>
+                    <a:bodyPr/>
+                    <a:lstStyle/>
+                    <a:p>
+                      <a:pPr algn="ctr" fontAlgn="ctr"/>
+                      <a:r>
+                        <a:rPr lang="en-US" sz="900" u="none" strike="noStrike">
+                          <a:effectLst/>
+                        </a:rPr>
+                        <a:t>4</a:t>
+                      </a:r>
+                      <a:endParaRPr lang="en-US" sz="900" b="1" i="0" u="none" strike="noStrike">
+                        <a:solidFill>
+                          <a:srgbClr val="000000"/>
+                        </a:solidFill>
+                        <a:effectLst/>
+                        <a:latin typeface="Calibri" panose="020F0502020204030204" pitchFamily="34" charset="0"/>
+                      </a:endParaRPr>
+                    </a:p>
+                  </a:txBody>
+                  <a:tcPr marL="7803" marR="7803" marT="7803" marB="0" anchor="ctr"/>
+                </a:tc>
+                <a:tc>
+                  <a:txBody>
+                    <a:bodyPr/>
+                    <a:lstStyle/>
+                    <a:p>
+                      <a:pPr algn="l" fontAlgn="ctr"/>
+                      <a:r>
+                        <a:rPr lang="en-US" sz="900" u="none" strike="noStrike">
+                          <a:effectLst/>
+                        </a:rPr>
+                        <a:t>Testing &amp; Quality Assurance (Q.A.)</a:t>
+                      </a:r>
+                      <a:endParaRPr lang="en-US" sz="900" b="1" i="0" u="none" strike="noStrike">
+                        <a:solidFill>
+                          <a:srgbClr val="000000"/>
+                        </a:solidFill>
+                        <a:effectLst/>
+                        <a:latin typeface="Calibri" panose="020F0502020204030204" pitchFamily="34" charset="0"/>
+                      </a:endParaRPr>
+                    </a:p>
+                  </a:txBody>
+                  <a:tcPr marL="7803" marR="7803" marT="7803" marB="0" anchor="ctr"/>
+                </a:tc>
+                <a:tc>
+                  <a:txBody>
+                    <a:bodyPr/>
+                    <a:lstStyle/>
+                    <a:p>
+                      <a:pPr algn="l" fontAlgn="ctr"/>
+                      <a:r>
+                        <a:rPr lang="en-US" sz="900" u="none" strike="noStrike">
+                          <a:effectLst/>
+                        </a:rPr>
+                        <a:t>Verifying the product performs as designed.</a:t>
+                      </a:r>
+                      <a:endParaRPr lang="en-US" sz="900" b="0" i="0" u="none" strike="noStrike">
+                        <a:solidFill>
+                          <a:srgbClr val="000000"/>
+                        </a:solidFill>
+                        <a:effectLst/>
+                        <a:latin typeface="Calibri" panose="020F0502020204030204" pitchFamily="34" charset="0"/>
+                      </a:endParaRPr>
+                    </a:p>
+                  </a:txBody>
+                  <a:tcPr marL="7803" marR="7803" marT="7803" marB="0" anchor="ctr"/>
+                </a:tc>
+                <a:tc vMerge="1">
+                  <a:txBody>
+                    <a:bodyPr/>
+                    <a:lstStyle/>
+                    <a:p>
+                      <a:endParaRPr lang="en-US"/>
+                    </a:p>
+                  </a:txBody>
+                  <a:tcPr/>
+                </a:tc>
+                <a:tc>
+                  <a:txBody>
+                    <a:bodyPr/>
+                    <a:lstStyle/>
+                    <a:p>
+                      <a:pPr algn="ctr" fontAlgn="ctr"/>
+                      <a:r>
+                        <a:rPr lang="en-US" sz="900" u="none" strike="noStrike">
+                          <a:effectLst/>
+                        </a:rPr>
+                        <a:t>2/17/2019</a:t>
+                      </a:r>
+                      <a:endParaRPr lang="en-US" sz="900" b="1" i="0" u="none" strike="noStrike">
+                        <a:solidFill>
+                          <a:srgbClr val="000000"/>
+                        </a:solidFill>
+                        <a:effectLst/>
+                        <a:latin typeface="Calibri" panose="020F0502020204030204" pitchFamily="34" charset="0"/>
+                      </a:endParaRPr>
+                    </a:p>
+                  </a:txBody>
+                  <a:tcPr marL="7803" marR="7803" marT="7803" marB="0" anchor="ctr"/>
+                </a:tc>
+                <a:tc>
+                  <a:txBody>
+                    <a:bodyPr/>
+                    <a:lstStyle/>
+                    <a:p>
+                      <a:pPr algn="ctr" fontAlgn="ctr"/>
+                      <a:r>
+                        <a:rPr lang="en-US" sz="900" u="none" strike="noStrike">
+                          <a:effectLst/>
+                        </a:rPr>
+                        <a:t>3/29/2019</a:t>
+                      </a:r>
+                      <a:endParaRPr lang="en-US" sz="900" b="1" i="0" u="none" strike="noStrike">
+                        <a:solidFill>
+                          <a:srgbClr val="000000"/>
+                        </a:solidFill>
+                        <a:effectLst/>
+                        <a:latin typeface="Calibri" panose="020F0502020204030204" pitchFamily="34" charset="0"/>
+                      </a:endParaRPr>
+                    </a:p>
+                  </a:txBody>
+                  <a:tcPr marL="7803" marR="7803" marT="7803" marB="0" anchor="ctr"/>
+                </a:tc>
+                <a:tc>
+                  <a:txBody>
+                    <a:bodyPr/>
+                    <a:lstStyle/>
+                    <a:p>
+                      <a:pPr algn="ctr" fontAlgn="ctr"/>
+                      <a:r>
+                        <a:rPr lang="en-US" sz="900" u="none" strike="noStrike">
+                          <a:effectLst/>
+                        </a:rPr>
+                        <a:t>35</a:t>
+                      </a:r>
+                      <a:endParaRPr lang="en-US" sz="900" b="1" i="0" u="none" strike="noStrike">
+                        <a:solidFill>
+                          <a:srgbClr val="000000"/>
+                        </a:solidFill>
+                        <a:effectLst/>
+                        <a:latin typeface="Calibri" panose="020F0502020204030204" pitchFamily="34" charset="0"/>
+                      </a:endParaRPr>
+                    </a:p>
+                  </a:txBody>
+                  <a:tcPr marL="7803" marR="7803" marT="7803" marB="0" anchor="ctr"/>
+                </a:tc>
+                <a:extLst>
+                  <a:ext uri="{0D108BD9-81ED-4DB2-BD59-A6C34878D82A}">
+                    <a16:rowId xmlns:a16="http://schemas.microsoft.com/office/drawing/2014/main" val="1476914095"/>
+                  </a:ext>
+                </a:extLst>
+              </a:tr>
+              <a:tr h="143117">
+                <a:tc>
+                  <a:txBody>
+                    <a:bodyPr/>
+                    <a:lstStyle/>
+                    <a:p>
+                      <a:pPr algn="ctr" fontAlgn="ctr"/>
+                      <a:r>
+                        <a:rPr lang="en-US" sz="900" u="none" strike="noStrike">
+                          <a:effectLst/>
+                        </a:rPr>
+                        <a:t>4.1</a:t>
+                      </a:r>
+                      <a:endParaRPr lang="en-US" sz="900" b="0" i="0" u="none" strike="noStrike">
+                        <a:solidFill>
+                          <a:srgbClr val="000000"/>
+                        </a:solidFill>
+                        <a:effectLst/>
+                        <a:latin typeface="Calibri" panose="020F0502020204030204" pitchFamily="34" charset="0"/>
+                      </a:endParaRPr>
+                    </a:p>
+                  </a:txBody>
+                  <a:tcPr marL="7803" marR="7803" marT="7803" marB="0" anchor="ctr"/>
+                </a:tc>
+                <a:tc>
+                  <a:txBody>
+                    <a:bodyPr/>
+                    <a:lstStyle/>
+                    <a:p>
+                      <a:pPr algn="l" fontAlgn="ctr"/>
+                      <a:r>
+                        <a:rPr lang="en-US" sz="900" u="none" strike="noStrike">
+                          <a:effectLst/>
+                        </a:rPr>
+                        <a:t>Packer Q.A.</a:t>
+                      </a:r>
+                      <a:endParaRPr lang="en-US" sz="900" b="0" i="0" u="none" strike="noStrike">
+                        <a:solidFill>
+                          <a:srgbClr val="000000"/>
+                        </a:solidFill>
+                        <a:effectLst/>
+                        <a:latin typeface="Calibri" panose="020F0502020204030204" pitchFamily="34" charset="0"/>
+                      </a:endParaRPr>
+                    </a:p>
+                  </a:txBody>
+                  <a:tcPr marL="7803" marR="7803" marT="7803" marB="0" anchor="ctr"/>
+                </a:tc>
+                <a:tc>
+                  <a:txBody>
+                    <a:bodyPr/>
+                    <a:lstStyle/>
+                    <a:p>
+                      <a:pPr algn="l" fontAlgn="ctr"/>
+                      <a:r>
+                        <a:rPr lang="en-US" sz="900" u="none" strike="noStrike">
+                          <a:effectLst/>
+                        </a:rPr>
+                        <a:t>Check packer performance.</a:t>
+                      </a:r>
+                      <a:endParaRPr lang="en-US" sz="900" b="0" i="0" u="none" strike="noStrike">
+                        <a:solidFill>
+                          <a:srgbClr val="000000"/>
+                        </a:solidFill>
+                        <a:effectLst/>
+                        <a:latin typeface="Calibri" panose="020F0502020204030204" pitchFamily="34" charset="0"/>
+                      </a:endParaRPr>
+                    </a:p>
+                  </a:txBody>
+                  <a:tcPr marL="7803" marR="7803" marT="7803" marB="0" anchor="ctr"/>
+                </a:tc>
+                <a:tc vMerge="1">
+                  <a:txBody>
+                    <a:bodyPr/>
+                    <a:lstStyle/>
+                    <a:p>
+                      <a:endParaRPr lang="en-US"/>
+                    </a:p>
+                  </a:txBody>
+                  <a:tcPr/>
+                </a:tc>
+                <a:tc>
+                  <a:txBody>
+                    <a:bodyPr/>
+                    <a:lstStyle/>
+                    <a:p>
+                      <a:pPr algn="ctr" fontAlgn="ctr"/>
+                      <a:r>
+                        <a:rPr lang="en-US" sz="900" u="none" strike="noStrike">
+                          <a:effectLst/>
+                        </a:rPr>
+                        <a:t>2/17/2019</a:t>
+                      </a:r>
+                      <a:endParaRPr lang="en-US" sz="900" b="0" i="0" u="none" strike="noStrike">
+                        <a:solidFill>
+                          <a:srgbClr val="000000"/>
+                        </a:solidFill>
+                        <a:effectLst/>
+                        <a:latin typeface="Calibri" panose="020F0502020204030204" pitchFamily="34" charset="0"/>
+                      </a:endParaRPr>
+                    </a:p>
+                  </a:txBody>
+                  <a:tcPr marL="7803" marR="7803" marT="7803" marB="0" anchor="ctr"/>
+                </a:tc>
+                <a:tc>
+                  <a:txBody>
+                    <a:bodyPr/>
+                    <a:lstStyle/>
+                    <a:p>
+                      <a:pPr algn="ctr" fontAlgn="ctr"/>
+                      <a:r>
+                        <a:rPr lang="en-US" sz="900" u="none" strike="noStrike">
+                          <a:effectLst/>
+                        </a:rPr>
+                        <a:t>2/23/2019</a:t>
+                      </a:r>
+                      <a:endParaRPr lang="en-US" sz="900" b="0" i="0" u="none" strike="noStrike">
+                        <a:solidFill>
+                          <a:srgbClr val="000000"/>
+                        </a:solidFill>
+                        <a:effectLst/>
+                        <a:latin typeface="Calibri" panose="020F0502020204030204" pitchFamily="34" charset="0"/>
+                      </a:endParaRPr>
+                    </a:p>
+                  </a:txBody>
+                  <a:tcPr marL="7803" marR="7803" marT="7803" marB="0" anchor="ctr"/>
+                </a:tc>
+                <a:tc>
+                  <a:txBody>
+                    <a:bodyPr/>
+                    <a:lstStyle/>
+                    <a:p>
+                      <a:pPr algn="ctr" fontAlgn="ctr"/>
+                      <a:r>
+                        <a:rPr lang="en-US" sz="900" u="none" strike="noStrike">
+                          <a:effectLst/>
+                        </a:rPr>
+                        <a:t>7</a:t>
+                      </a:r>
+                      <a:endParaRPr lang="en-US" sz="900" b="0" i="0" u="none" strike="noStrike">
+                        <a:solidFill>
+                          <a:srgbClr val="000000"/>
+                        </a:solidFill>
+                        <a:effectLst/>
+                        <a:latin typeface="Calibri" panose="020F0502020204030204" pitchFamily="34" charset="0"/>
+                      </a:endParaRPr>
+                    </a:p>
+                  </a:txBody>
+                  <a:tcPr marL="7803" marR="7803" marT="7803" marB="0" anchor="ctr"/>
+                </a:tc>
+                <a:extLst>
+                  <a:ext uri="{0D108BD9-81ED-4DB2-BD59-A6C34878D82A}">
+                    <a16:rowId xmlns:a16="http://schemas.microsoft.com/office/drawing/2014/main" val="546473684"/>
+                  </a:ext>
+                </a:extLst>
+              </a:tr>
+              <a:tr h="143117">
+                <a:tc>
+                  <a:txBody>
+                    <a:bodyPr/>
+                    <a:lstStyle/>
+                    <a:p>
+                      <a:pPr algn="ctr" fontAlgn="ctr"/>
+                      <a:r>
+                        <a:rPr lang="en-US" sz="900" u="none" strike="noStrike">
+                          <a:effectLst/>
+                        </a:rPr>
+                        <a:t>4.2</a:t>
+                      </a:r>
+                      <a:endParaRPr lang="en-US" sz="900" b="0" i="0" u="none" strike="noStrike">
+                        <a:solidFill>
+                          <a:srgbClr val="000000"/>
+                        </a:solidFill>
+                        <a:effectLst/>
+                        <a:latin typeface="Calibri" panose="020F0502020204030204" pitchFamily="34" charset="0"/>
+                      </a:endParaRPr>
+                    </a:p>
+                  </a:txBody>
+                  <a:tcPr marL="7803" marR="7803" marT="7803" marB="0" anchor="ctr"/>
+                </a:tc>
+                <a:tc>
+                  <a:txBody>
+                    <a:bodyPr/>
+                    <a:lstStyle/>
+                    <a:p>
+                      <a:pPr algn="l" fontAlgn="ctr"/>
+                      <a:r>
+                        <a:rPr lang="en-US" sz="900" u="none" strike="noStrike">
+                          <a:effectLst/>
+                        </a:rPr>
+                        <a:t>Loader Q.A.</a:t>
+                      </a:r>
+                      <a:endParaRPr lang="en-US" sz="900" b="0" i="0" u="none" strike="noStrike">
+                        <a:solidFill>
+                          <a:srgbClr val="000000"/>
+                        </a:solidFill>
+                        <a:effectLst/>
+                        <a:latin typeface="Calibri" panose="020F0502020204030204" pitchFamily="34" charset="0"/>
+                      </a:endParaRPr>
+                    </a:p>
+                  </a:txBody>
+                  <a:tcPr marL="7803" marR="7803" marT="7803" marB="0" anchor="ctr"/>
+                </a:tc>
+                <a:tc>
+                  <a:txBody>
+                    <a:bodyPr/>
+                    <a:lstStyle/>
+                    <a:p>
+                      <a:pPr algn="l" fontAlgn="ctr"/>
+                      <a:r>
+                        <a:rPr lang="en-US" sz="900" u="none" strike="noStrike">
+                          <a:effectLst/>
+                        </a:rPr>
+                        <a:t>Check loader performance.</a:t>
+                      </a:r>
+                      <a:endParaRPr lang="en-US" sz="900" b="0" i="0" u="none" strike="noStrike">
+                        <a:solidFill>
+                          <a:srgbClr val="000000"/>
+                        </a:solidFill>
+                        <a:effectLst/>
+                        <a:latin typeface="Calibri" panose="020F0502020204030204" pitchFamily="34" charset="0"/>
+                      </a:endParaRPr>
+                    </a:p>
+                  </a:txBody>
+                  <a:tcPr marL="7803" marR="7803" marT="7803" marB="0" anchor="ctr"/>
+                </a:tc>
+                <a:tc vMerge="1">
+                  <a:txBody>
+                    <a:bodyPr/>
+                    <a:lstStyle/>
+                    <a:p>
+                      <a:endParaRPr lang="en-US"/>
+                    </a:p>
+                  </a:txBody>
+                  <a:tcPr/>
+                </a:tc>
+                <a:tc>
+                  <a:txBody>
+                    <a:bodyPr/>
+                    <a:lstStyle/>
+                    <a:p>
+                      <a:pPr algn="ctr" fontAlgn="ctr"/>
+                      <a:r>
+                        <a:rPr lang="en-US" sz="900" u="none" strike="noStrike">
+                          <a:effectLst/>
+                        </a:rPr>
+                        <a:t>2/24/2019</a:t>
+                      </a:r>
+                      <a:endParaRPr lang="en-US" sz="900" b="0" i="0" u="none" strike="noStrike">
+                        <a:solidFill>
+                          <a:srgbClr val="000000"/>
+                        </a:solidFill>
+                        <a:effectLst/>
+                        <a:latin typeface="Calibri" panose="020F0502020204030204" pitchFamily="34" charset="0"/>
+                      </a:endParaRPr>
+                    </a:p>
+                  </a:txBody>
+                  <a:tcPr marL="7803" marR="7803" marT="7803" marB="0" anchor="ctr"/>
+                </a:tc>
+                <a:tc>
+                  <a:txBody>
+                    <a:bodyPr/>
+                    <a:lstStyle/>
+                    <a:p>
+                      <a:pPr algn="ctr" fontAlgn="ctr"/>
+                      <a:r>
+                        <a:rPr lang="en-US" sz="900" u="none" strike="noStrike">
+                          <a:effectLst/>
+                        </a:rPr>
+                        <a:t>3/1/2019</a:t>
+                      </a:r>
+                      <a:endParaRPr lang="en-US" sz="900" b="0" i="0" u="none" strike="noStrike">
+                        <a:solidFill>
+                          <a:srgbClr val="000000"/>
+                        </a:solidFill>
+                        <a:effectLst/>
+                        <a:latin typeface="Calibri" panose="020F0502020204030204" pitchFamily="34" charset="0"/>
+                      </a:endParaRPr>
+                    </a:p>
+                  </a:txBody>
+                  <a:tcPr marL="7803" marR="7803" marT="7803" marB="0" anchor="ctr"/>
+                </a:tc>
+                <a:tc>
+                  <a:txBody>
+                    <a:bodyPr/>
+                    <a:lstStyle/>
+                    <a:p>
+                      <a:pPr algn="ctr" fontAlgn="ctr"/>
+                      <a:r>
+                        <a:rPr lang="en-US" sz="900" u="none" strike="noStrike">
+                          <a:effectLst/>
+                        </a:rPr>
+                        <a:t>7</a:t>
+                      </a:r>
+                      <a:endParaRPr lang="en-US" sz="900" b="0" i="0" u="none" strike="noStrike">
+                        <a:solidFill>
+                          <a:srgbClr val="000000"/>
+                        </a:solidFill>
+                        <a:effectLst/>
+                        <a:latin typeface="Calibri" panose="020F0502020204030204" pitchFamily="34" charset="0"/>
+                      </a:endParaRPr>
+                    </a:p>
+                  </a:txBody>
+                  <a:tcPr marL="7803" marR="7803" marT="7803" marB="0" anchor="ctr"/>
+                </a:tc>
+                <a:extLst>
+                  <a:ext uri="{0D108BD9-81ED-4DB2-BD59-A6C34878D82A}">
+                    <a16:rowId xmlns:a16="http://schemas.microsoft.com/office/drawing/2014/main" val="2921705013"/>
+                  </a:ext>
+                </a:extLst>
+              </a:tr>
+              <a:tr h="143117">
+                <a:tc>
+                  <a:txBody>
+                    <a:bodyPr/>
+                    <a:lstStyle/>
+                    <a:p>
+                      <a:pPr algn="ctr" fontAlgn="ctr"/>
+                      <a:r>
+                        <a:rPr lang="en-US" sz="900" u="none" strike="noStrike">
+                          <a:effectLst/>
+                        </a:rPr>
+                        <a:t>4.3</a:t>
+                      </a:r>
+                      <a:endParaRPr lang="en-US" sz="900" b="0" i="0" u="none" strike="noStrike">
+                        <a:solidFill>
+                          <a:srgbClr val="000000"/>
+                        </a:solidFill>
+                        <a:effectLst/>
+                        <a:latin typeface="Calibri" panose="020F0502020204030204" pitchFamily="34" charset="0"/>
+                      </a:endParaRPr>
+                    </a:p>
+                  </a:txBody>
+                  <a:tcPr marL="7803" marR="7803" marT="7803" marB="0" anchor="ctr"/>
+                </a:tc>
+                <a:tc>
+                  <a:txBody>
+                    <a:bodyPr/>
+                    <a:lstStyle/>
+                    <a:p>
+                      <a:pPr algn="l" fontAlgn="ctr"/>
+                      <a:r>
+                        <a:rPr lang="en-US" sz="900" u="none" strike="noStrike" dirty="0">
+                          <a:effectLst/>
+                        </a:rPr>
+                        <a:t>Networking Integration Q.A.</a:t>
+                      </a:r>
+                      <a:endParaRPr lang="en-US" sz="900" b="0" i="0" u="none" strike="noStrike" dirty="0">
+                        <a:solidFill>
+                          <a:srgbClr val="000000"/>
+                        </a:solidFill>
+                        <a:effectLst/>
+                        <a:latin typeface="Calibri" panose="020F0502020204030204" pitchFamily="34" charset="0"/>
+                      </a:endParaRPr>
+                    </a:p>
+                  </a:txBody>
+                  <a:tcPr marL="7803" marR="7803" marT="7803" marB="0" anchor="ctr"/>
+                </a:tc>
+                <a:tc>
+                  <a:txBody>
+                    <a:bodyPr/>
+                    <a:lstStyle/>
+                    <a:p>
+                      <a:pPr algn="l" fontAlgn="ctr"/>
+                      <a:r>
+                        <a:rPr lang="en-US" sz="900" u="none" strike="noStrike">
+                          <a:effectLst/>
+                        </a:rPr>
+                        <a:t>Check network performance.</a:t>
+                      </a:r>
+                      <a:endParaRPr lang="en-US" sz="900" b="0" i="0" u="none" strike="noStrike">
+                        <a:solidFill>
+                          <a:srgbClr val="000000"/>
+                        </a:solidFill>
+                        <a:effectLst/>
+                        <a:latin typeface="Calibri" panose="020F0502020204030204" pitchFamily="34" charset="0"/>
+                      </a:endParaRPr>
+                    </a:p>
+                  </a:txBody>
+                  <a:tcPr marL="7803" marR="7803" marT="7803" marB="0" anchor="ctr"/>
+                </a:tc>
+                <a:tc vMerge="1">
+                  <a:txBody>
+                    <a:bodyPr/>
+                    <a:lstStyle/>
+                    <a:p>
+                      <a:endParaRPr lang="en-US"/>
+                    </a:p>
+                  </a:txBody>
+                  <a:tcPr/>
+                </a:tc>
+                <a:tc>
+                  <a:txBody>
+                    <a:bodyPr/>
+                    <a:lstStyle/>
+                    <a:p>
+                      <a:pPr algn="ctr" fontAlgn="ctr"/>
+                      <a:r>
+                        <a:rPr lang="en-US" sz="900" u="none" strike="noStrike">
+                          <a:effectLst/>
+                        </a:rPr>
+                        <a:t>3/2/2019</a:t>
+                      </a:r>
+                      <a:endParaRPr lang="en-US" sz="900" b="0" i="0" u="none" strike="noStrike">
+                        <a:solidFill>
+                          <a:srgbClr val="000000"/>
+                        </a:solidFill>
+                        <a:effectLst/>
+                        <a:latin typeface="Calibri" panose="020F0502020204030204" pitchFamily="34" charset="0"/>
+                      </a:endParaRPr>
+                    </a:p>
+                  </a:txBody>
+                  <a:tcPr marL="7803" marR="7803" marT="7803" marB="0" anchor="ctr"/>
+                </a:tc>
+                <a:tc>
+                  <a:txBody>
+                    <a:bodyPr/>
+                    <a:lstStyle/>
+                    <a:p>
+                      <a:pPr algn="ctr" fontAlgn="ctr"/>
+                      <a:r>
+                        <a:rPr lang="en-US" sz="900" u="none" strike="noStrike">
+                          <a:effectLst/>
+                        </a:rPr>
+                        <a:t>3/8/2019</a:t>
+                      </a:r>
+                      <a:endParaRPr lang="en-US" sz="900" b="0" i="0" u="none" strike="noStrike">
+                        <a:solidFill>
+                          <a:srgbClr val="000000"/>
+                        </a:solidFill>
+                        <a:effectLst/>
+                        <a:latin typeface="Calibri" panose="020F0502020204030204" pitchFamily="34" charset="0"/>
+                      </a:endParaRPr>
+                    </a:p>
+                  </a:txBody>
+                  <a:tcPr marL="7803" marR="7803" marT="7803" marB="0" anchor="ctr"/>
+                </a:tc>
+                <a:tc>
+                  <a:txBody>
+                    <a:bodyPr/>
+                    <a:lstStyle/>
+                    <a:p>
+                      <a:pPr algn="ctr" fontAlgn="ctr"/>
+                      <a:r>
+                        <a:rPr lang="en-US" sz="900" u="none" strike="noStrike">
+                          <a:effectLst/>
+                        </a:rPr>
+                        <a:t>7</a:t>
+                      </a:r>
+                      <a:endParaRPr lang="en-US" sz="900" b="0" i="0" u="none" strike="noStrike">
+                        <a:solidFill>
+                          <a:srgbClr val="000000"/>
+                        </a:solidFill>
+                        <a:effectLst/>
+                        <a:latin typeface="Calibri" panose="020F0502020204030204" pitchFamily="34" charset="0"/>
+                      </a:endParaRPr>
+                    </a:p>
+                  </a:txBody>
+                  <a:tcPr marL="7803" marR="7803" marT="7803" marB="0" anchor="ctr"/>
+                </a:tc>
+                <a:extLst>
+                  <a:ext uri="{0D108BD9-81ED-4DB2-BD59-A6C34878D82A}">
+                    <a16:rowId xmlns:a16="http://schemas.microsoft.com/office/drawing/2014/main" val="943739016"/>
+                  </a:ext>
+                </a:extLst>
+              </a:tr>
+              <a:tr h="143117">
+                <a:tc>
+                  <a:txBody>
+                    <a:bodyPr/>
+                    <a:lstStyle/>
+                    <a:p>
+                      <a:pPr algn="ctr" fontAlgn="ctr"/>
+                      <a:r>
+                        <a:rPr lang="en-US" sz="900" u="none" strike="noStrike">
+                          <a:effectLst/>
+                        </a:rPr>
+                        <a:t>4.4</a:t>
+                      </a:r>
+                      <a:endParaRPr lang="en-US" sz="900" b="0" i="0" u="none" strike="noStrike">
+                        <a:solidFill>
+                          <a:srgbClr val="000000"/>
+                        </a:solidFill>
+                        <a:effectLst/>
+                        <a:latin typeface="Calibri" panose="020F0502020204030204" pitchFamily="34" charset="0"/>
+                      </a:endParaRPr>
+                    </a:p>
+                  </a:txBody>
+                  <a:tcPr marL="7803" marR="7803" marT="7803" marB="0" anchor="ctr"/>
+                </a:tc>
+                <a:tc>
+                  <a:txBody>
+                    <a:bodyPr/>
+                    <a:lstStyle/>
+                    <a:p>
+                      <a:pPr algn="l" fontAlgn="ctr"/>
+                      <a:r>
+                        <a:rPr lang="en-US" sz="900" u="none" strike="noStrike">
+                          <a:effectLst/>
+                        </a:rPr>
+                        <a:t>Customer Deployment</a:t>
+                      </a:r>
+                      <a:endParaRPr lang="en-US" sz="900" b="0" i="0" u="none" strike="noStrike">
+                        <a:solidFill>
+                          <a:srgbClr val="000000"/>
+                        </a:solidFill>
+                        <a:effectLst/>
+                        <a:latin typeface="Calibri" panose="020F0502020204030204" pitchFamily="34" charset="0"/>
+                      </a:endParaRPr>
+                    </a:p>
+                  </a:txBody>
+                  <a:tcPr marL="7803" marR="7803" marT="7803" marB="0" anchor="ctr"/>
+                </a:tc>
+                <a:tc>
+                  <a:txBody>
+                    <a:bodyPr/>
+                    <a:lstStyle/>
+                    <a:p>
+                      <a:pPr algn="l" fontAlgn="ctr"/>
+                      <a:r>
+                        <a:rPr lang="en-US" sz="900" u="none" strike="noStrike">
+                          <a:effectLst/>
+                        </a:rPr>
+                        <a:t>Have customer deploy product in their enviornment for user testing.</a:t>
+                      </a:r>
+                      <a:endParaRPr lang="en-US" sz="900" b="0" i="0" u="none" strike="noStrike">
+                        <a:solidFill>
+                          <a:srgbClr val="000000"/>
+                        </a:solidFill>
+                        <a:effectLst/>
+                        <a:latin typeface="Calibri" panose="020F0502020204030204" pitchFamily="34" charset="0"/>
+                      </a:endParaRPr>
+                    </a:p>
+                  </a:txBody>
+                  <a:tcPr marL="7803" marR="7803" marT="7803" marB="0" anchor="ctr"/>
+                </a:tc>
+                <a:tc vMerge="1">
+                  <a:txBody>
+                    <a:bodyPr/>
+                    <a:lstStyle/>
+                    <a:p>
+                      <a:endParaRPr lang="en-US"/>
+                    </a:p>
+                  </a:txBody>
+                  <a:tcPr/>
+                </a:tc>
+                <a:tc>
+                  <a:txBody>
+                    <a:bodyPr/>
+                    <a:lstStyle/>
+                    <a:p>
+                      <a:pPr algn="ctr" fontAlgn="ctr"/>
+                      <a:r>
+                        <a:rPr lang="en-US" sz="900" u="none" strike="noStrike">
+                          <a:effectLst/>
+                        </a:rPr>
+                        <a:t>3/16/2019</a:t>
+                      </a:r>
+                      <a:endParaRPr lang="en-US" sz="900" b="0" i="0" u="none" strike="noStrike">
+                        <a:solidFill>
+                          <a:srgbClr val="000000"/>
+                        </a:solidFill>
+                        <a:effectLst/>
+                        <a:latin typeface="Calibri" panose="020F0502020204030204" pitchFamily="34" charset="0"/>
+                      </a:endParaRPr>
+                    </a:p>
+                  </a:txBody>
+                  <a:tcPr marL="7803" marR="7803" marT="7803" marB="0" anchor="ctr"/>
+                </a:tc>
+                <a:tc>
+                  <a:txBody>
+                    <a:bodyPr/>
+                    <a:lstStyle/>
+                    <a:p>
+                      <a:pPr algn="ctr" fontAlgn="ctr"/>
+                      <a:r>
+                        <a:rPr lang="en-US" sz="900" u="none" strike="noStrike">
+                          <a:effectLst/>
+                        </a:rPr>
+                        <a:t>3/22/2019</a:t>
+                      </a:r>
+                      <a:endParaRPr lang="en-US" sz="900" b="0" i="0" u="none" strike="noStrike">
+                        <a:solidFill>
+                          <a:srgbClr val="000000"/>
+                        </a:solidFill>
+                        <a:effectLst/>
+                        <a:latin typeface="Calibri" panose="020F0502020204030204" pitchFamily="34" charset="0"/>
+                      </a:endParaRPr>
+                    </a:p>
+                  </a:txBody>
+                  <a:tcPr marL="7803" marR="7803" marT="7803" marB="0" anchor="ctr"/>
+                </a:tc>
+                <a:tc>
+                  <a:txBody>
+                    <a:bodyPr/>
+                    <a:lstStyle/>
+                    <a:p>
+                      <a:pPr algn="ctr" fontAlgn="ctr"/>
+                      <a:r>
+                        <a:rPr lang="en-US" sz="900" u="none" strike="noStrike">
+                          <a:effectLst/>
+                        </a:rPr>
+                        <a:t>7</a:t>
+                      </a:r>
+                      <a:endParaRPr lang="en-US" sz="900" b="0" i="0" u="none" strike="noStrike">
+                        <a:solidFill>
+                          <a:srgbClr val="000000"/>
+                        </a:solidFill>
+                        <a:effectLst/>
+                        <a:latin typeface="Calibri" panose="020F0502020204030204" pitchFamily="34" charset="0"/>
+                      </a:endParaRPr>
+                    </a:p>
+                  </a:txBody>
+                  <a:tcPr marL="7803" marR="7803" marT="7803" marB="0" anchor="ctr"/>
+                </a:tc>
+                <a:extLst>
+                  <a:ext uri="{0D108BD9-81ED-4DB2-BD59-A6C34878D82A}">
+                    <a16:rowId xmlns:a16="http://schemas.microsoft.com/office/drawing/2014/main" val="3635911651"/>
+                  </a:ext>
+                </a:extLst>
+              </a:tr>
+              <a:tr h="143117">
+                <a:tc>
+                  <a:txBody>
+                    <a:bodyPr/>
+                    <a:lstStyle/>
+                    <a:p>
+                      <a:pPr algn="ctr" fontAlgn="ctr"/>
+                      <a:r>
+                        <a:rPr lang="en-US" sz="900" u="none" strike="noStrike">
+                          <a:effectLst/>
+                        </a:rPr>
+                        <a:t>4.5</a:t>
+                      </a:r>
+                      <a:endParaRPr lang="en-US" sz="900" b="0" i="0" u="none" strike="noStrike">
+                        <a:solidFill>
+                          <a:srgbClr val="000000"/>
+                        </a:solidFill>
+                        <a:effectLst/>
+                        <a:latin typeface="Calibri" panose="020F0502020204030204" pitchFamily="34" charset="0"/>
+                      </a:endParaRPr>
+                    </a:p>
+                  </a:txBody>
+                  <a:tcPr marL="7803" marR="7803" marT="7803" marB="0" anchor="ctr"/>
+                </a:tc>
+                <a:tc>
+                  <a:txBody>
+                    <a:bodyPr/>
+                    <a:lstStyle/>
+                    <a:p>
+                      <a:pPr algn="l" fontAlgn="ctr"/>
+                      <a:r>
+                        <a:rPr lang="en-US" sz="900" u="none" strike="noStrike">
+                          <a:effectLst/>
+                        </a:rPr>
+                        <a:t>Findal Development</a:t>
+                      </a:r>
+                      <a:endParaRPr lang="en-US" sz="900" b="0" i="0" u="none" strike="noStrike">
+                        <a:solidFill>
+                          <a:srgbClr val="000000"/>
+                        </a:solidFill>
+                        <a:effectLst/>
+                        <a:latin typeface="Calibri" panose="020F0502020204030204" pitchFamily="34" charset="0"/>
+                      </a:endParaRPr>
+                    </a:p>
+                  </a:txBody>
+                  <a:tcPr marL="7803" marR="7803" marT="7803" marB="0" anchor="ctr"/>
+                </a:tc>
+                <a:tc>
+                  <a:txBody>
+                    <a:bodyPr/>
+                    <a:lstStyle/>
+                    <a:p>
+                      <a:pPr algn="l" fontAlgn="ctr"/>
+                      <a:r>
+                        <a:rPr lang="en-US" sz="900" u="none" strike="noStrike">
+                          <a:effectLst/>
+                        </a:rPr>
+                        <a:t>Final touches and packaging and workflow to meet customer requests.</a:t>
+                      </a:r>
+                      <a:endParaRPr lang="en-US" sz="900" b="0" i="0" u="none" strike="noStrike">
+                        <a:solidFill>
+                          <a:srgbClr val="000000"/>
+                        </a:solidFill>
+                        <a:effectLst/>
+                        <a:latin typeface="Calibri" panose="020F0502020204030204" pitchFamily="34" charset="0"/>
+                      </a:endParaRPr>
+                    </a:p>
+                  </a:txBody>
+                  <a:tcPr marL="7803" marR="7803" marT="7803" marB="0" anchor="ctr"/>
+                </a:tc>
+                <a:tc vMerge="1">
+                  <a:txBody>
+                    <a:bodyPr/>
+                    <a:lstStyle/>
+                    <a:p>
+                      <a:endParaRPr lang="en-US"/>
+                    </a:p>
+                  </a:txBody>
+                  <a:tcPr/>
+                </a:tc>
+                <a:tc>
+                  <a:txBody>
+                    <a:bodyPr/>
+                    <a:lstStyle/>
+                    <a:p>
+                      <a:pPr algn="ctr" fontAlgn="ctr"/>
+                      <a:r>
+                        <a:rPr lang="en-US" sz="900" u="none" strike="noStrike">
+                          <a:effectLst/>
+                        </a:rPr>
+                        <a:t>3/23/2019</a:t>
+                      </a:r>
+                      <a:endParaRPr lang="en-US" sz="900" b="0" i="0" u="none" strike="noStrike">
+                        <a:solidFill>
+                          <a:srgbClr val="000000"/>
+                        </a:solidFill>
+                        <a:effectLst/>
+                        <a:latin typeface="Calibri" panose="020F0502020204030204" pitchFamily="34" charset="0"/>
+                      </a:endParaRPr>
+                    </a:p>
+                  </a:txBody>
+                  <a:tcPr marL="7803" marR="7803" marT="7803" marB="0" anchor="ctr"/>
+                </a:tc>
+                <a:tc>
+                  <a:txBody>
+                    <a:bodyPr/>
+                    <a:lstStyle/>
+                    <a:p>
+                      <a:pPr algn="ctr" fontAlgn="ctr"/>
+                      <a:r>
+                        <a:rPr lang="en-US" sz="900" u="none" strike="noStrike">
+                          <a:effectLst/>
+                        </a:rPr>
+                        <a:t>3/29/2019</a:t>
+                      </a:r>
+                      <a:endParaRPr lang="en-US" sz="900" b="0" i="0" u="none" strike="noStrike">
+                        <a:solidFill>
+                          <a:srgbClr val="000000"/>
+                        </a:solidFill>
+                        <a:effectLst/>
+                        <a:latin typeface="Calibri" panose="020F0502020204030204" pitchFamily="34" charset="0"/>
+                      </a:endParaRPr>
+                    </a:p>
+                  </a:txBody>
+                  <a:tcPr marL="7803" marR="7803" marT="7803" marB="0" anchor="ctr"/>
+                </a:tc>
+                <a:tc>
+                  <a:txBody>
+                    <a:bodyPr/>
+                    <a:lstStyle/>
+                    <a:p>
+                      <a:pPr algn="ctr" fontAlgn="ctr"/>
+                      <a:r>
+                        <a:rPr lang="en-US" sz="900" u="none" strike="noStrike" dirty="0">
+                          <a:effectLst/>
+                        </a:rPr>
+                        <a:t>14</a:t>
+                      </a:r>
+                      <a:endParaRPr lang="en-US" sz="900" b="0" i="0" u="none" strike="noStrike" dirty="0">
+                        <a:solidFill>
+                          <a:srgbClr val="000000"/>
+                        </a:solidFill>
+                        <a:effectLst/>
+                        <a:latin typeface="Calibri" panose="020F0502020204030204" pitchFamily="34" charset="0"/>
+                      </a:endParaRPr>
+                    </a:p>
+                  </a:txBody>
+                  <a:tcPr marL="7803" marR="7803" marT="7803" marB="0" anchor="ctr"/>
+                </a:tc>
+                <a:extLst>
+                  <a:ext uri="{0D108BD9-81ED-4DB2-BD59-A6C34878D82A}">
+                    <a16:rowId xmlns:a16="http://schemas.microsoft.com/office/drawing/2014/main" val="167842346"/>
+                  </a:ext>
+                </a:extLst>
+              </a:tr>
+            </a:tbl>
+          </a:graphicData>
+        </a:graphic>
+      </p:graphicFrame>
     </p:spTree>
     <p:extLst>
       <p:ext uri="{BB962C8B-B14F-4D97-AF65-F5344CB8AC3E}">
@@ -2775,66 +6319,6 @@
       </p:grpSpPr>
       <p:sp>
         <p:nvSpPr>
-          <p:cNvPr id="3" name="Content Placeholder 2"/>
-          <p:cNvSpPr>
-            <a:spLocks noGrp="1"/>
-          </p:cNvSpPr>
-          <p:nvPr>
-            <p:ph idx="1"/>
-          </p:nvPr>
-        </p:nvSpPr>
-        <p:spPr>
-          <a:xfrm>
-            <a:off x="790759" y="2954868"/>
-            <a:ext cx="7035042" cy="534262"/>
-          </a:xfrm>
-        </p:spPr>
-        <p:txBody>
-          <a:bodyPr>
-            <a:normAutofit fontScale="62500" lnSpcReduction="20000"/>
-          </a:bodyPr>
-          <a:lstStyle/>
-          <a:p>
-            <a:pPr marL="0" indent="0">
-              <a:buNone/>
-            </a:pPr>
-            <a:r>
-              <a:rPr lang="en-US" sz="2400" i="1" dirty="0">
-                <a:solidFill>
-                  <a:srgbClr val="0000FF"/>
-                </a:solidFill>
-              </a:rPr>
-              <a:t>(Insert proposal schedule </a:t>
-            </a:r>
-            <a:r>
-              <a:rPr lang="en-US" sz="2400" i="1" dirty="0" err="1">
-                <a:solidFill>
-                  <a:srgbClr val="0000FF"/>
-                </a:solidFill>
-              </a:rPr>
-              <a:t>gant</a:t>
-            </a:r>
-            <a:r>
-              <a:rPr lang="en-US" sz="2400" i="1" dirty="0">
-                <a:solidFill>
-                  <a:srgbClr val="0000FF"/>
-                </a:solidFill>
-              </a:rPr>
-              <a:t> chart here and provide status-&gt; </a:t>
-            </a:r>
-            <a:r>
-              <a:rPr lang="en-US" sz="2400" i="1" dirty="0">
-                <a:solidFill>
-                  <a:srgbClr val="FF0000"/>
-                </a:solidFill>
-              </a:rPr>
-              <a:t>DRAW VERTICAL LINE AT SUBMITAL DATE AND ADD COMMENTS AS TO BEHIND OR AHEAD OF SCHEDULE  ) </a:t>
-            </a:r>
-          </a:p>
-        </p:txBody>
-      </p:sp>
-      <p:sp>
-        <p:nvSpPr>
           <p:cNvPr id="5" name="Rectangle 4"/>
           <p:cNvSpPr/>
           <p:nvPr/>
@@ -2855,22 +6339,131 @@
           <a:lstStyle/>
           <a:p>
             <a:r>
-              <a:rPr lang="en-US" sz="3600" dirty="0"/>
+              <a:rPr lang="en-US" sz="3600"/>
               <a:t>Schedule</a:t>
             </a:r>
           </a:p>
         </p:txBody>
       </p:sp>
+      <p:pic>
+        <p:nvPicPr>
+          <p:cNvPr id="8" name="Picture 7">
+            <a:extLst>
+              <a:ext uri="{FF2B5EF4-FFF2-40B4-BE49-F238E27FC236}">
+                <a16:creationId xmlns:a16="http://schemas.microsoft.com/office/drawing/2014/main" id="{C4357EB2-853C-4A76-BCB3-7E73ED7E309C}"/>
+              </a:ext>
+            </a:extLst>
+          </p:cNvPr>
+          <p:cNvPicPr>
+            <a:picLocks noChangeAspect="1"/>
+          </p:cNvPicPr>
+          <p:nvPr/>
+        </p:nvPicPr>
+        <p:blipFill>
+          <a:blip r:embed="rId2"/>
+          <a:stretch>
+            <a:fillRect/>
+          </a:stretch>
+        </p:blipFill>
+        <p:spPr>
+          <a:xfrm>
+            <a:off x="508227" y="1532032"/>
+            <a:ext cx="8097253" cy="2292091"/>
+          </a:xfrm>
+          <a:prstGeom prst="rect">
+            <a:avLst/>
+          </a:prstGeom>
+        </p:spPr>
+        <p:style>
+          <a:lnRef idx="2">
+            <a:schemeClr val="dk1"/>
+          </a:lnRef>
+          <a:fillRef idx="1">
+            <a:schemeClr val="lt1"/>
+          </a:fillRef>
+          <a:effectRef idx="0">
+            <a:schemeClr val="dk1"/>
+          </a:effectRef>
+          <a:fontRef idx="minor">
+            <a:schemeClr val="dk1"/>
+          </a:fontRef>
+        </p:style>
+      </p:pic>
       <p:sp>
         <p:nvSpPr>
-          <p:cNvPr id="4" name="TextBox 3"/>
+          <p:cNvPr id="9" name="TextBox 8">
+            <a:extLst>
+              <a:ext uri="{FF2B5EF4-FFF2-40B4-BE49-F238E27FC236}">
+                <a16:creationId xmlns:a16="http://schemas.microsoft.com/office/drawing/2014/main" id="{82326886-261E-4D28-9AE6-81C8DDB2AC9B}"/>
+              </a:ext>
+            </a:extLst>
+          </p:cNvPr>
           <p:cNvSpPr txBox="1"/>
           <p:nvPr/>
         </p:nvSpPr>
         <p:spPr>
           <a:xfrm>
-            <a:off x="6401348" y="741744"/>
-            <a:ext cx="1840844" cy="369332"/>
+            <a:off x="457200" y="3948601"/>
+            <a:ext cx="7566148" cy="701731"/>
+          </a:xfrm>
+          <a:prstGeom prst="rect">
+            <a:avLst/>
+          </a:prstGeom>
+          <a:noFill/>
+        </p:spPr>
+        <p:txBody>
+          <a:bodyPr wrap="square" rtlCol="0" anchor="t">
+            <a:spAutoFit/>
+          </a:bodyPr>
+          <a:lstStyle/>
+          <a:p>
+            <a:r>
+              <a:rPr lang="en-US" dirty="0"/>
+              <a:t>Comments:</a:t>
+            </a:r>
+            <a:endParaRPr lang="en-US" dirty="0">
+              <a:cs typeface="Calibri"/>
+            </a:endParaRPr>
+          </a:p>
+          <a:p>
+            <a:pPr marL="285750" indent="-285750" fontAlgn="base">
+              <a:spcBef>
+                <a:spcPct val="20000"/>
+              </a:spcBef>
+              <a:spcAft>
+                <a:spcPct val="0"/>
+              </a:spcAft>
+              <a:buFont typeface="Arial" panose="020B0604020202020204" pitchFamily="34" charset="0"/>
+              <a:buChar char="•"/>
+            </a:pPr>
+            <a:r>
+              <a:rPr lang="en-US" dirty="0">
+                <a:solidFill>
+                  <a:srgbClr val="0000FF"/>
+                </a:solidFill>
+                <a:ea typeface="ＭＳ Ｐゴシック" charset="0"/>
+              </a:rPr>
+              <a:t>Behind schedule on 3.1 - 3.3 (see critical milestones on previous slide)</a:t>
+            </a:r>
+          </a:p>
+        </p:txBody>
+      </p:sp>
+      <p:sp>
+        <p:nvSpPr>
+          <p:cNvPr id="10" name="TextBox 9">
+            <a:extLst>
+              <a:ext uri="{FF2B5EF4-FFF2-40B4-BE49-F238E27FC236}">
+                <a16:creationId xmlns:a16="http://schemas.microsoft.com/office/drawing/2014/main" id="{36170E0D-FCCE-46C4-B087-8F612B7E72B0}"/>
+              </a:ext>
+            </a:extLst>
+          </p:cNvPr>
+          <p:cNvSpPr txBox="1"/>
+          <p:nvPr/>
+        </p:nvSpPr>
+        <p:spPr>
+          <a:xfrm>
+            <a:off x="6086880" y="784500"/>
+            <a:ext cx="1739772" cy="369332"/>
           </a:xfrm>
           <a:prstGeom prst="rect">
             <a:avLst/>
@@ -2885,8 +6478,13 @@
           <a:p>
             <a:r>
               <a:rPr lang="en-US" dirty="0"/>
-              <a:t>Date:__________</a:t>
-            </a:r>
+              <a:t>Date: </a:t>
+            </a:r>
+            <a:r>
+              <a:rPr lang="en-US" u="sng" dirty="0"/>
+              <a:t>12/4/2019</a:t>
+            </a:r>
+            <a:endParaRPr lang="en-US" dirty="0"/>
           </a:p>
         </p:txBody>
       </p:sp>
@@ -2926,32 +6524,26 @@
           <p:cNvGraphicFramePr>
             <a:graphicFrameLocks noChangeAspect="1"/>
           </p:cNvGraphicFramePr>
-          <p:nvPr>
-            <p:extLst>
-              <p:ext uri="{D42A27DB-BD31-4B8C-83A1-F6EECF244321}">
-                <p14:modId xmlns:p14="http://schemas.microsoft.com/office/powerpoint/2010/main" val="1926742296"/>
-              </p:ext>
-            </p:extLst>
-          </p:nvPr>
+          <p:nvPr/>
         </p:nvGraphicFramePr>
         <p:xfrm>
-          <a:off x="280977" y="1665816"/>
-          <a:ext cx="8462060" cy="4386965"/>
+          <a:off x="279400" y="1558925"/>
+          <a:ext cx="8466138" cy="4600575"/>
         </p:xfrm>
         <a:graphic>
           <a:graphicData uri="http://schemas.openxmlformats.org/presentationml/2006/ole">
             <mc:AlternateContent xmlns:mc="http://schemas.openxmlformats.org/markup-compatibility/2006">
               <mc:Choice xmlns:v="urn:schemas-microsoft-com:vml" Requires="v">
-                <p:oleObj spid="_x0000_s2086" name="Worksheet" r:id="rId3" imgW="5168900" imgH="2679700" progId="Excel.Sheet.12">
+                <p:oleObj spid="_x0000_s2051" name="Worksheet" r:id="rId3" imgW="5171999" imgH="2809811" progId="Excel.Sheet.12">
                   <p:embed/>
                 </p:oleObj>
               </mc:Choice>
               <mc:Fallback>
-                <p:oleObj name="Worksheet" r:id="rId3" imgW="5168900" imgH="2679700" progId="Excel.Sheet.12">
+                <p:oleObj name="Worksheet" r:id="rId3" imgW="5171999" imgH="2809811" progId="Excel.Sheet.12">
                   <p:embed/>
                   <p:pic>
                     <p:nvPicPr>
-                      <p:cNvPr id="0" name=""/>
+                      <p:cNvPr id="6" name="Object 5"/>
                       <p:cNvPicPr/>
                       <p:nvPr/>
                     </p:nvPicPr>
@@ -2963,8 +6555,8 @@
                     </p:blipFill>
                     <p:spPr>
                       <a:xfrm>
-                        <a:off x="280977" y="1665816"/>
-                        <a:ext cx="8462060" cy="4386965"/>
+                        <a:off x="279400" y="1558925"/>
+                        <a:ext cx="8466138" cy="4600575"/>
                       </a:xfrm>
                       <a:prstGeom prst="rect">
                         <a:avLst/>
@@ -3106,7 +6698,7 @@
         <p:spPr>
           <a:xfrm>
             <a:off x="5907028" y="737310"/>
-            <a:ext cx="1840844" cy="369332"/>
+            <a:ext cx="1739772" cy="369332"/>
           </a:xfrm>
           <a:prstGeom prst="rect">
             <a:avLst/>
@@ -3121,8 +6713,55 @@
           <a:p>
             <a:r>
               <a:rPr lang="en-US" dirty="0"/>
-              <a:t>Date:__________</a:t>
-            </a:r>
+              <a:t>Date: </a:t>
+            </a:r>
+            <a:r>
+              <a:rPr lang="en-US" u="sng" dirty="0"/>
+              <a:t>12/4/2019</a:t>
+            </a:r>
+            <a:endParaRPr lang="en-US" dirty="0"/>
+          </a:p>
+        </p:txBody>
+      </p:sp>
+      <p:sp>
+        <p:nvSpPr>
+          <p:cNvPr id="4" name="Footer Placeholder 3">
+            <a:extLst>
+              <a:ext uri="{FF2B5EF4-FFF2-40B4-BE49-F238E27FC236}">
+                <a16:creationId xmlns:a16="http://schemas.microsoft.com/office/drawing/2014/main" id="{E2415F83-2637-48F9-B1D7-6C3DC60CDAE0}"/>
+              </a:ext>
+            </a:extLst>
+          </p:cNvPr>
+          <p:cNvSpPr>
+            <a:spLocks noGrp="1"/>
+          </p:cNvSpPr>
+          <p:nvPr>
+            <p:ph type="ftr" sz="quarter" idx="11"/>
+          </p:nvPr>
+        </p:nvSpPr>
+        <p:spPr/>
+        <p:txBody>
+          <a:bodyPr/>
+          <a:lstStyle/>
+          <a:p>
+            <a:endParaRPr lang="en-US">
+              <a:solidFill>
+                <a:prstClr val="black">
+                  <a:tint val="75000"/>
+                </a:prstClr>
+              </a:solidFill>
+              <a:latin typeface="Calibri"/>
+            </a:endParaRPr>
+          </a:p>
+          <a:p>
+            <a:endParaRPr lang="en-US" dirty="0">
+              <a:solidFill>
+                <a:prstClr val="black">
+                  <a:tint val="75000"/>
+                </a:prstClr>
+              </a:solidFill>
+              <a:latin typeface="Calibri"/>
+            </a:endParaRPr>
           </a:p>
         </p:txBody>
       </p:sp>

</xml_diff>